<commit_message>
Added accomplishments section, increased text size, organized images
Co-Authored-By: Ayaan31 <54915736+Ayaan31@users.noreply.github.com>
Co-Authored-By: javilj <122557682+javilj@users.noreply.github.com>
</commit_message>
<xml_diff>
--- a/poster_stuff/RCOS Poster.pptx
+++ b/poster_stuff/RCOS Poster.pptx
@@ -304,7 +304,7 @@
       </p15:notesGuideLst>
     </p:ext>
     <p:ext uri="GoogleSlidesCustomDataVersion2">
-      <go:slidesCustomData xmlns:go="http://customooxmlschemas.google.com/" r:id="rId13" roundtripDataSignature="AMtx7minJVNxa/k5I5jao2P7AfYPwcJbTA=="/>
+      <go:slidesCustomData xmlns:go="http://customooxmlschemas.google.com/" r:id="rId13" roundtripDataSignature="AMtx7mhn9t1ymCE5aQQUmbAfB/qqu2jv2g=="/>
     </p:ext>
   </p:extLst>
 </p:presentation>
@@ -5750,7 +5750,7 @@
             <a:tbl>
               <a:tblPr bandRow="1" firstRow="1">
                 <a:noFill/>
-                <a:tableStyleId>{261DF5CF-7200-4CB6-A714-90A51BBBAF26}</a:tableStyleId>
+                <a:tableStyleId>{98998D19-8B81-4D96-B0D9-706AD21F430B}</a:tableStyleId>
               </a:tblPr>
               <a:tblGrid>
                 <a:gridCol w="4192250"/>
@@ -7279,7 +7279,7 @@
             <a:tbl>
               <a:tblPr bandRow="1" firstRow="1">
                 <a:noFill/>
-                <a:tableStyleId>{261DF5CF-7200-4CB6-A714-90A51BBBAF26}</a:tableStyleId>
+                <a:tableStyleId>{98998D19-8B81-4D96-B0D9-706AD21F430B}</a:tableStyleId>
               </a:tblPr>
               <a:tblGrid>
                 <a:gridCol w="3343825"/>
@@ -9541,18 +9541,17 @@
           <p:cNvPicPr preferRelativeResize="0"/>
           <p:nvPr/>
         </p:nvPicPr>
-        <p:blipFill>
+        <p:blipFill rotWithShape="1">
           <a:blip r:embed="rId3">
             <a:alphaModFix amt="50000"/>
           </a:blip>
-          <a:stretch>
-            <a:fillRect/>
-          </a:stretch>
+          <a:srcRect b="1989" l="0" r="0" t="0"/>
+          <a:stretch/>
         </p:blipFill>
         <p:spPr>
           <a:xfrm>
-            <a:off x="5472875" y="0"/>
-            <a:ext cx="32918400" cy="32918400"/>
+            <a:off x="5472874" y="347643"/>
+            <a:ext cx="32918400" cy="32263711"/>
           </a:xfrm>
           <a:prstGeom prst="rect">
             <a:avLst/>
@@ -9579,8 +9578,8 @@
         </p:blipFill>
         <p:spPr>
           <a:xfrm>
-            <a:off x="464625" y="17404026"/>
-            <a:ext cx="10047000" cy="14718700"/>
+            <a:off x="11433400" y="6481473"/>
+            <a:ext cx="10047000" cy="6152899"/>
           </a:xfrm>
           <a:prstGeom prst="rect">
             <a:avLst/>
@@ -9591,24 +9590,18 @@
           </a:ln>
         </p:spPr>
       </p:pic>
-      <p:pic>
-        <p:nvPicPr>
+      <p:sp>
+        <p:nvSpPr>
           <p:cNvPr id="37" name="Google Shape;37;p1"/>
-          <p:cNvPicPr preferRelativeResize="0"/>
-          <p:nvPr/>
-        </p:nvPicPr>
-        <p:blipFill>
-          <a:blip r:embed="rId4">
-            <a:alphaModFix amt="77000"/>
-          </a:blip>
-          <a:stretch>
-            <a:fillRect/>
-          </a:stretch>
-        </p:blipFill>
+          <p:cNvSpPr txBox="1"/>
+          <p:nvPr>
+            <p:ph idx="4" type="body"/>
+          </p:nvPr>
+        </p:nvSpPr>
         <p:spPr>
           <a:xfrm>
-            <a:off x="33405900" y="6750874"/>
-            <a:ext cx="10047000" cy="11173825"/>
+            <a:off x="11460161" y="6378481"/>
+            <a:ext cx="10048800" cy="6464700"/>
           </a:xfrm>
           <a:prstGeom prst="rect">
             <a:avLst/>
@@ -9618,7 +9611,250 @@
             <a:noFill/>
           </a:ln>
         </p:spPr>
-      </p:pic>
+        <p:txBody>
+          <a:bodyPr anchorCtr="0" anchor="t" bIns="228575" lIns="228575" spcFirstLastPara="1" rIns="228575" wrap="square" tIns="228575">
+            <a:spAutoFit/>
+          </a:bodyPr>
+          <a:lstStyle/>
+          <a:p>
+            <a:pPr indent="-419100" lvl="0" marL="457200" rtl="0" algn="l">
+              <a:lnSpc>
+                <a:spcPct val="150000"/>
+              </a:lnSpc>
+              <a:spcBef>
+                <a:spcPts val="0"/>
+              </a:spcBef>
+              <a:spcAft>
+                <a:spcPts val="0"/>
+              </a:spcAft>
+              <a:buClr>
+                <a:schemeClr val="dk1"/>
+              </a:buClr>
+              <a:buSzPts val="3000"/>
+              <a:buFont typeface="Helvetica Neue"/>
+              <a:buChar char="●"/>
+            </a:pPr>
+            <a:r>
+              <a:rPr lang="en-US" sz="3000">
+                <a:solidFill>
+                  <a:schemeClr val="dk1"/>
+                </a:solidFill>
+                <a:latin typeface="Helvetica Neue"/>
+                <a:ea typeface="Helvetica Neue"/>
+                <a:cs typeface="Helvetica Neue"/>
+                <a:sym typeface="Helvetica Neue"/>
+              </a:rPr>
+              <a:t>Provide students with a resource to quickly and easily test code anywhere, anytime</a:t>
+            </a:r>
+            <a:endParaRPr sz="3000">
+              <a:solidFill>
+                <a:schemeClr val="dk1"/>
+              </a:solidFill>
+              <a:latin typeface="Helvetica Neue"/>
+              <a:ea typeface="Helvetica Neue"/>
+              <a:cs typeface="Helvetica Neue"/>
+              <a:sym typeface="Helvetica Neue"/>
+            </a:endParaRPr>
+          </a:p>
+          <a:p>
+            <a:pPr indent="-419100" lvl="0" marL="457200" rtl="0" algn="l">
+              <a:lnSpc>
+                <a:spcPct val="150000"/>
+              </a:lnSpc>
+              <a:spcBef>
+                <a:spcPts val="0"/>
+              </a:spcBef>
+              <a:spcAft>
+                <a:spcPts val="0"/>
+              </a:spcAft>
+              <a:buClr>
+                <a:schemeClr val="dk1"/>
+              </a:buClr>
+              <a:buSzPts val="3000"/>
+              <a:buFont typeface="Helvetica Neue"/>
+              <a:buChar char="●"/>
+            </a:pPr>
+            <a:r>
+              <a:rPr lang="en-US" sz="3000">
+                <a:solidFill>
+                  <a:schemeClr val="dk1"/>
+                </a:solidFill>
+                <a:latin typeface="Helvetica Neue"/>
+                <a:ea typeface="Helvetica Neue"/>
+                <a:cs typeface="Helvetica Neue"/>
+                <a:sym typeface="Helvetica Neue"/>
+              </a:rPr>
+              <a:t>Create a user friendly and functional UI</a:t>
+            </a:r>
+            <a:endParaRPr sz="3000">
+              <a:solidFill>
+                <a:schemeClr val="dk1"/>
+              </a:solidFill>
+              <a:latin typeface="Helvetica Neue"/>
+              <a:ea typeface="Helvetica Neue"/>
+              <a:cs typeface="Helvetica Neue"/>
+              <a:sym typeface="Helvetica Neue"/>
+            </a:endParaRPr>
+          </a:p>
+          <a:p>
+            <a:pPr indent="-419100" lvl="0" marL="457200" rtl="0" algn="l">
+              <a:lnSpc>
+                <a:spcPct val="150000"/>
+              </a:lnSpc>
+              <a:spcBef>
+                <a:spcPts val="0"/>
+              </a:spcBef>
+              <a:spcAft>
+                <a:spcPts val="0"/>
+              </a:spcAft>
+              <a:buClr>
+                <a:schemeClr val="dk1"/>
+              </a:buClr>
+              <a:buSzPts val="3000"/>
+              <a:buFont typeface="Helvetica Neue"/>
+              <a:buChar char="●"/>
+            </a:pPr>
+            <a:r>
+              <a:rPr lang="en-US" sz="3000">
+                <a:solidFill>
+                  <a:schemeClr val="dk1"/>
+                </a:solidFill>
+                <a:latin typeface="Helvetica Neue"/>
+                <a:ea typeface="Helvetica Neue"/>
+                <a:cs typeface="Helvetica Neue"/>
+                <a:sym typeface="Helvetica Neue"/>
+              </a:rPr>
+              <a:t>Learn how to run code written in different languages within Python</a:t>
+            </a:r>
+            <a:endParaRPr sz="3000">
+              <a:solidFill>
+                <a:schemeClr val="dk1"/>
+              </a:solidFill>
+              <a:latin typeface="Helvetica Neue"/>
+              <a:ea typeface="Helvetica Neue"/>
+              <a:cs typeface="Helvetica Neue"/>
+              <a:sym typeface="Helvetica Neue"/>
+            </a:endParaRPr>
+          </a:p>
+          <a:p>
+            <a:pPr indent="-419100" lvl="0" marL="457200" rtl="0" algn="l">
+              <a:lnSpc>
+                <a:spcPct val="150000"/>
+              </a:lnSpc>
+              <a:spcBef>
+                <a:spcPts val="0"/>
+              </a:spcBef>
+              <a:spcAft>
+                <a:spcPts val="0"/>
+              </a:spcAft>
+              <a:buClr>
+                <a:schemeClr val="dk1"/>
+              </a:buClr>
+              <a:buSzPts val="3000"/>
+              <a:buFont typeface="Helvetica Neue"/>
+              <a:buChar char="●"/>
+            </a:pPr>
+            <a:r>
+              <a:rPr lang="en-US" sz="3000">
+                <a:solidFill>
+                  <a:schemeClr val="dk1"/>
+                </a:solidFill>
+                <a:latin typeface="Helvetica Neue"/>
+                <a:ea typeface="Helvetica Neue"/>
+                <a:cs typeface="Helvetica Neue"/>
+                <a:sym typeface="Helvetica Neue"/>
+              </a:rPr>
+              <a:t>Encourage students to develop better testing habits</a:t>
+            </a:r>
+            <a:endParaRPr sz="3000">
+              <a:solidFill>
+                <a:schemeClr val="dk1"/>
+              </a:solidFill>
+              <a:latin typeface="Helvetica Neue"/>
+              <a:ea typeface="Helvetica Neue"/>
+              <a:cs typeface="Helvetica Neue"/>
+              <a:sym typeface="Helvetica Neue"/>
+            </a:endParaRPr>
+          </a:p>
+          <a:p>
+            <a:pPr indent="-419100" lvl="0" marL="457200" rtl="0" algn="l">
+              <a:lnSpc>
+                <a:spcPct val="150000"/>
+              </a:lnSpc>
+              <a:spcBef>
+                <a:spcPts val="0"/>
+              </a:spcBef>
+              <a:spcAft>
+                <a:spcPts val="0"/>
+              </a:spcAft>
+              <a:buClr>
+                <a:schemeClr val="dk1"/>
+              </a:buClr>
+              <a:buSzPts val="3000"/>
+              <a:buFont typeface="Helvetica Neue"/>
+              <a:buChar char="●"/>
+            </a:pPr>
+            <a:r>
+              <a:rPr lang="en-US" sz="3000">
+                <a:solidFill>
+                  <a:schemeClr val="dk1"/>
+                </a:solidFill>
+                <a:latin typeface="Helvetica Neue"/>
+                <a:ea typeface="Helvetica Neue"/>
+                <a:cs typeface="Helvetica Neue"/>
+                <a:sym typeface="Helvetica Neue"/>
+              </a:rPr>
+              <a:t>Relieve stress off Submitty servers</a:t>
+            </a:r>
+            <a:endParaRPr sz="3000">
+              <a:solidFill>
+                <a:schemeClr val="dk1"/>
+              </a:solidFill>
+              <a:latin typeface="Helvetica Neue"/>
+              <a:ea typeface="Helvetica Neue"/>
+              <a:cs typeface="Helvetica Neue"/>
+              <a:sym typeface="Helvetica Neue"/>
+            </a:endParaRPr>
+          </a:p>
+          <a:p>
+            <a:pPr indent="-419100" lvl="0" marL="457200" rtl="0" algn="l">
+              <a:lnSpc>
+                <a:spcPct val="150000"/>
+              </a:lnSpc>
+              <a:spcBef>
+                <a:spcPts val="0"/>
+              </a:spcBef>
+              <a:spcAft>
+                <a:spcPts val="0"/>
+              </a:spcAft>
+              <a:buClr>
+                <a:schemeClr val="dk1"/>
+              </a:buClr>
+              <a:buSzPts val="3000"/>
+              <a:buFont typeface="Helvetica Neue"/>
+              <a:buChar char="●"/>
+            </a:pPr>
+            <a:r>
+              <a:rPr lang="en-US" sz="3000">
+                <a:solidFill>
+                  <a:schemeClr val="dk1"/>
+                </a:solidFill>
+                <a:latin typeface="Helvetica Neue"/>
+                <a:ea typeface="Helvetica Neue"/>
+                <a:cs typeface="Helvetica Neue"/>
+                <a:sym typeface="Helvetica Neue"/>
+              </a:rPr>
+              <a:t>Apply the skills we’ve learned to create a useful product</a:t>
+            </a:r>
+            <a:endParaRPr sz="3000">
+              <a:latin typeface="Helvetica Neue"/>
+              <a:ea typeface="Helvetica Neue"/>
+              <a:cs typeface="Helvetica Neue"/>
+              <a:sym typeface="Helvetica Neue"/>
+            </a:endParaRPr>
+          </a:p>
+        </p:txBody>
+      </p:sp>
       <p:pic>
         <p:nvPicPr>
           <p:cNvPr id="38" name="Google Shape;38;p1"/>
@@ -9635,8 +9871,8 @@
         </p:blipFill>
         <p:spPr>
           <a:xfrm>
-            <a:off x="464625" y="6534650"/>
-            <a:ext cx="10047000" cy="9959263"/>
+            <a:off x="12050625" y="17304450"/>
+            <a:ext cx="20478900" cy="14718700"/>
           </a:xfrm>
           <a:prstGeom prst="rect">
             <a:avLst/>
@@ -9663,8 +9899,36 @@
         </p:blipFill>
         <p:spPr>
           <a:xfrm>
-            <a:off x="11433400" y="6520350"/>
-            <a:ext cx="10047000" cy="4872925"/>
+            <a:off x="33405900" y="6750875"/>
+            <a:ext cx="10219900" cy="12022975"/>
+          </a:xfrm>
+          <a:prstGeom prst="rect">
+            <a:avLst/>
+          </a:prstGeom>
+          <a:noFill/>
+          <a:ln>
+            <a:noFill/>
+          </a:ln>
+        </p:spPr>
+      </p:pic>
+      <p:pic>
+        <p:nvPicPr>
+          <p:cNvPr id="40" name="Google Shape;40;p1"/>
+          <p:cNvPicPr preferRelativeResize="0"/>
+          <p:nvPr/>
+        </p:nvPicPr>
+        <p:blipFill>
+          <a:blip r:embed="rId4">
+            <a:alphaModFix amt="77000"/>
+          </a:blip>
+          <a:stretch>
+            <a:fillRect/>
+          </a:stretch>
+        </p:blipFill>
+        <p:spPr>
+          <a:xfrm>
+            <a:off x="464625" y="6534650"/>
+            <a:ext cx="10047000" cy="11732899"/>
           </a:xfrm>
           <a:prstGeom prst="rect">
             <a:avLst/>
@@ -9677,7 +9941,7 @@
       </p:pic>
       <p:sp>
         <p:nvSpPr>
-          <p:cNvPr id="40" name="Google Shape;40;p1"/>
+          <p:cNvPr id="41" name="Google Shape;41;p1"/>
           <p:cNvSpPr txBox="1"/>
           <p:nvPr>
             <p:ph idx="9" type="body"/>
@@ -9685,7 +9949,7 @@
         </p:nvSpPr>
         <p:spPr>
           <a:xfrm>
-            <a:off x="33379800" y="6770700"/>
+            <a:off x="33405900" y="6657450"/>
             <a:ext cx="10047000" cy="11154000"/>
           </a:xfrm>
           <a:prstGeom prst="rect">
@@ -9702,7 +9966,7 @@
           </a:bodyPr>
           <a:lstStyle/>
           <a:p>
-            <a:pPr indent="-406400" lvl="0" marL="457200" rtl="0" algn="l">
+            <a:pPr indent="-419100" lvl="0" marL="457200" rtl="0" algn="l">
               <a:lnSpc>
                 <a:spcPct val="115000"/>
               </a:lnSpc>
@@ -9715,12 +9979,12 @@
               <a:buClr>
                 <a:schemeClr val="dk1"/>
               </a:buClr>
-              <a:buSzPts val="2800"/>
+              <a:buSzPts val="3000"/>
               <a:buFont typeface="Arial"/>
               <a:buChar char="●"/>
             </a:pPr>
             <a:r>
-              <a:rPr lang="en-US" sz="2800">
+              <a:rPr lang="en-US" sz="3000">
                 <a:solidFill>
                   <a:schemeClr val="dk1"/>
                 </a:solidFill>
@@ -9731,7 +9995,7 @@
               </a:rPr>
               <a:t>We made our mock ups in figma</a:t>
             </a:r>
-            <a:endParaRPr sz="2800">
+            <a:endParaRPr sz="3000">
               <a:solidFill>
                 <a:schemeClr val="dk1"/>
               </a:solidFill>
@@ -9742,7 +10006,7 @@
             </a:endParaRPr>
           </a:p>
           <a:p>
-            <a:pPr indent="-406400" lvl="1" marL="914400" rtl="0" algn="l">
+            <a:pPr indent="-419100" lvl="1" marL="914400" rtl="0" algn="l">
               <a:lnSpc>
                 <a:spcPct val="115000"/>
               </a:lnSpc>
@@ -9755,12 +10019,12 @@
               <a:buClr>
                 <a:schemeClr val="dk1"/>
               </a:buClr>
-              <a:buSzPts val="2800"/>
+              <a:buSzPts val="3000"/>
               <a:buFont typeface="Arial"/>
               <a:buChar char="○"/>
             </a:pPr>
             <a:r>
-              <a:rPr lang="en-US" sz="2800">
+              <a:rPr lang="en-US" sz="3000">
                 <a:solidFill>
                   <a:schemeClr val="dk1"/>
                 </a:solidFill>
@@ -9771,7 +10035,7 @@
               </a:rPr>
               <a:t>it was easy to use and it allowed us to easily collaborate with each other. </a:t>
             </a:r>
-            <a:endParaRPr sz="2800">
+            <a:endParaRPr sz="3000">
               <a:solidFill>
                 <a:schemeClr val="dk1"/>
               </a:solidFill>
@@ -9782,7 +10046,7 @@
             </a:endParaRPr>
           </a:p>
           <a:p>
-            <a:pPr indent="-406400" lvl="0" marL="457200" rtl="0" algn="l">
+            <a:pPr indent="-419100" lvl="0" marL="457200" rtl="0" algn="l">
               <a:lnSpc>
                 <a:spcPct val="115000"/>
               </a:lnSpc>
@@ -9795,12 +10059,12 @@
               <a:buClr>
                 <a:schemeClr val="dk1"/>
               </a:buClr>
-              <a:buSzPts val="2800"/>
+              <a:buSzPts val="3000"/>
               <a:buFont typeface="Arial"/>
               <a:buChar char="●"/>
             </a:pPr>
             <a:r>
-              <a:rPr lang="en-US" sz="2800">
+              <a:rPr lang="en-US" sz="3000">
                 <a:solidFill>
                   <a:schemeClr val="dk1"/>
                 </a:solidFill>
@@ -9811,7 +10075,7 @@
               </a:rPr>
               <a:t>We decided to make our front end user interface with python and the custom TKinter library. We decided to go with the custom TKinter because:</a:t>
             </a:r>
-            <a:endParaRPr sz="2800">
+            <a:endParaRPr sz="3000">
               <a:solidFill>
                 <a:schemeClr val="dk1"/>
               </a:solidFill>
@@ -9822,7 +10086,7 @@
             </a:endParaRPr>
           </a:p>
           <a:p>
-            <a:pPr indent="-406400" lvl="1" marL="914400" rtl="0" algn="l">
+            <a:pPr indent="-419100" lvl="1" marL="914400" rtl="0" algn="l">
               <a:lnSpc>
                 <a:spcPct val="115000"/>
               </a:lnSpc>
@@ -9835,12 +10099,12 @@
               <a:buClr>
                 <a:schemeClr val="dk1"/>
               </a:buClr>
-              <a:buSzPts val="2800"/>
+              <a:buSzPts val="3000"/>
               <a:buFont typeface="Arial"/>
               <a:buChar char="○"/>
             </a:pPr>
             <a:r>
-              <a:rPr lang="en-US" sz="2800">
+              <a:rPr lang="en-US" sz="3000">
                 <a:latin typeface="Arial"/>
                 <a:ea typeface="Arial"/>
                 <a:cs typeface="Arial"/>
@@ -9849,7 +10113,7 @@
               <a:t>W</a:t>
             </a:r>
             <a:r>
-              <a:rPr lang="en-US" sz="2800">
+              <a:rPr lang="en-US" sz="3000">
                 <a:solidFill>
                   <a:schemeClr val="dk1"/>
                 </a:solidFill>
@@ -9861,7 +10125,7 @@
               <a:t>e thought that it wasn’t too difficult to understand with our group's previous experience in TKinter</a:t>
             </a:r>
             <a:r>
-              <a:rPr lang="en-US" sz="2800">
+              <a:rPr lang="en-US" sz="3000">
                 <a:latin typeface="Arial"/>
                 <a:ea typeface="Arial"/>
                 <a:cs typeface="Arial"/>
@@ -9869,7 +10133,7 @@
               </a:rPr>
               <a:t>.</a:t>
             </a:r>
-            <a:endParaRPr sz="2800">
+            <a:endParaRPr sz="3000">
               <a:solidFill>
                 <a:schemeClr val="dk1"/>
               </a:solidFill>
@@ -9880,7 +10144,7 @@
             </a:endParaRPr>
           </a:p>
           <a:p>
-            <a:pPr indent="-406400" lvl="1" marL="914400" rtl="0" algn="l">
+            <a:pPr indent="-419100" lvl="1" marL="914400" rtl="0" algn="l">
               <a:lnSpc>
                 <a:spcPct val="115000"/>
               </a:lnSpc>
@@ -9893,12 +10157,12 @@
               <a:buClr>
                 <a:schemeClr val="dk1"/>
               </a:buClr>
-              <a:buSzPts val="2800"/>
+              <a:buSzPts val="3000"/>
               <a:buFont typeface="Arial"/>
               <a:buChar char="○"/>
             </a:pPr>
             <a:r>
-              <a:rPr lang="en-US" sz="2800">
+              <a:rPr lang="en-US" sz="3000">
                 <a:latin typeface="Arial"/>
                 <a:ea typeface="Arial"/>
                 <a:cs typeface="Arial"/>
@@ -9907,7 +10171,7 @@
               <a:t>The </a:t>
             </a:r>
             <a:r>
-              <a:rPr lang="en-US" sz="2800">
+              <a:rPr lang="en-US" sz="3000">
                 <a:latin typeface="Arial"/>
                 <a:ea typeface="Arial"/>
                 <a:cs typeface="Arial"/>
@@ -9916,7 +10180,7 @@
               <a:t>library</a:t>
             </a:r>
             <a:r>
-              <a:rPr lang="en-US" sz="2800">
+              <a:rPr lang="en-US" sz="3000">
                 <a:solidFill>
                   <a:schemeClr val="dk1"/>
                 </a:solidFill>
@@ -9927,7 +10191,7 @@
               </a:rPr>
               <a:t> had some very nice looking widgets that we wanted to use such as buttons, labels, and option menus. </a:t>
             </a:r>
-            <a:endParaRPr sz="2800">
+            <a:endParaRPr sz="3000">
               <a:solidFill>
                 <a:schemeClr val="dk1"/>
               </a:solidFill>
@@ -9938,7 +10202,7 @@
             </a:endParaRPr>
           </a:p>
           <a:p>
-            <a:pPr indent="-406400" lvl="0" marL="457200" rtl="0" algn="l">
+            <a:pPr indent="-419100" lvl="0" marL="457200" rtl="0" algn="l">
               <a:lnSpc>
                 <a:spcPct val="115000"/>
               </a:lnSpc>
@@ -9951,12 +10215,12 @@
               <a:buClr>
                 <a:schemeClr val="dk1"/>
               </a:buClr>
-              <a:buSzPts val="2800"/>
+              <a:buSzPts val="3000"/>
               <a:buFont typeface="Arial"/>
               <a:buChar char="●"/>
             </a:pPr>
             <a:r>
-              <a:rPr lang="en-US" sz="2800">
+              <a:rPr lang="en-US" sz="3000">
                 <a:solidFill>
                   <a:schemeClr val="dk1"/>
                 </a:solidFill>
@@ -9967,7 +10231,7 @@
               </a:rPr>
               <a:t>Our design philosophy when making our frontend was that we wanted to emphasize the discoverability of our application. </a:t>
             </a:r>
-            <a:endParaRPr sz="2800">
+            <a:endParaRPr sz="3000">
               <a:solidFill>
                 <a:schemeClr val="dk1"/>
               </a:solidFill>
@@ -9978,7 +10242,7 @@
             </a:endParaRPr>
           </a:p>
           <a:p>
-            <a:pPr indent="-406400" lvl="0" marL="457200" rtl="0" algn="l">
+            <a:pPr indent="-419100" lvl="0" marL="457200" rtl="0" algn="l">
               <a:lnSpc>
                 <a:spcPct val="115000"/>
               </a:lnSpc>
@@ -9991,12 +10255,12 @@
               <a:buClr>
                 <a:schemeClr val="dk1"/>
               </a:buClr>
-              <a:buSzPts val="2800"/>
+              <a:buSzPts val="3000"/>
               <a:buFont typeface="Arial"/>
               <a:buChar char="●"/>
             </a:pPr>
             <a:r>
-              <a:rPr lang="en-US" sz="2800">
+              <a:rPr lang="en-US" sz="3000">
                 <a:solidFill>
                   <a:schemeClr val="dk1"/>
                 </a:solidFill>
@@ -10007,7 +10271,7 @@
               </a:rPr>
               <a:t>we implemented into the ability to change themes.</a:t>
             </a:r>
-            <a:endParaRPr sz="2800">
+            <a:endParaRPr sz="3000">
               <a:solidFill>
                 <a:schemeClr val="dk1"/>
               </a:solidFill>
@@ -10018,7 +10282,7 @@
             </a:endParaRPr>
           </a:p>
           <a:p>
-            <a:pPr indent="-406400" lvl="1" marL="914400" rtl="0" algn="l">
+            <a:pPr indent="-419100" lvl="1" marL="914400" rtl="0" algn="l">
               <a:lnSpc>
                 <a:spcPct val="115000"/>
               </a:lnSpc>
@@ -10031,12 +10295,12 @@
               <a:buClr>
                 <a:schemeClr val="dk1"/>
               </a:buClr>
-              <a:buSzPts val="2800"/>
+              <a:buSzPts val="3000"/>
               <a:buFont typeface="Arial"/>
               <a:buChar char="○"/>
             </a:pPr>
             <a:r>
-              <a:rPr lang="en-US" sz="2800">
+              <a:rPr lang="en-US" sz="3000">
                 <a:solidFill>
                   <a:schemeClr val="dk1"/>
                 </a:solidFill>
@@ -10047,7 +10311,7 @@
               </a:rPr>
               <a:t> In the “Settings” frame we allow the user to change the color of the theme that they want the user interface to have.</a:t>
             </a:r>
-            <a:endParaRPr sz="2800">
+            <a:endParaRPr sz="3000">
               <a:latin typeface="Arial"/>
               <a:ea typeface="Arial"/>
               <a:cs typeface="Arial"/>
@@ -10055,7 +10319,7 @@
             </a:endParaRPr>
           </a:p>
           <a:p>
-            <a:pPr indent="-406400" lvl="1" marL="914400" rtl="0" algn="l">
+            <a:pPr indent="-419100" lvl="1" marL="914400" rtl="0" algn="l">
               <a:lnSpc>
                 <a:spcPct val="115000"/>
               </a:lnSpc>
@@ -10068,12 +10332,12 @@
               <a:buClr>
                 <a:schemeClr val="dk1"/>
               </a:buClr>
-              <a:buSzPts val="2800"/>
+              <a:buSzPts val="3000"/>
               <a:buFont typeface="Arial"/>
               <a:buChar char="○"/>
             </a:pPr>
             <a:r>
-              <a:rPr lang="en-US" sz="2800">
+              <a:rPr lang="en-US" sz="3000">
                 <a:latin typeface="Arial"/>
                 <a:ea typeface="Arial"/>
                 <a:cs typeface="Arial"/>
@@ -10082,7 +10346,7 @@
               <a:t>t</a:t>
             </a:r>
             <a:r>
-              <a:rPr lang="en-US" sz="2800">
+              <a:rPr lang="en-US" sz="3000">
                 <a:solidFill>
                   <a:schemeClr val="dk1"/>
                 </a:solidFill>
@@ -10093,7 +10357,7 @@
               </a:rPr>
               <a:t>he app restarts and takes you back to the first frame with the theme now the color that you chose. </a:t>
             </a:r>
-            <a:endParaRPr sz="2800">
+            <a:endParaRPr sz="3000">
               <a:solidFill>
                 <a:schemeClr val="dk1"/>
               </a:solidFill>
@@ -10104,7 +10368,7 @@
             </a:endParaRPr>
           </a:p>
           <a:p>
-            <a:pPr indent="-406400" lvl="1" marL="914400" rtl="0" algn="l">
+            <a:pPr indent="-419100" lvl="1" marL="914400" rtl="0" algn="l">
               <a:lnSpc>
                 <a:spcPct val="115000"/>
               </a:lnSpc>
@@ -10117,12 +10381,12 @@
               <a:buClr>
                 <a:schemeClr val="dk1"/>
               </a:buClr>
-              <a:buSzPts val="2800"/>
+              <a:buSzPts val="3000"/>
               <a:buFont typeface="Arial"/>
               <a:buChar char="○"/>
             </a:pPr>
             <a:r>
-              <a:rPr lang="en-US" sz="2800">
+              <a:rPr lang="en-US" sz="3000">
                 <a:solidFill>
                   <a:schemeClr val="dk1"/>
                 </a:solidFill>
@@ -10133,7 +10397,7 @@
               </a:rPr>
               <a:t>Currently there are 5 color themes to choose from, dark, light, red, green and pink. </a:t>
             </a:r>
-            <a:endParaRPr sz="2800">
+            <a:endParaRPr sz="3000">
               <a:solidFill>
                 <a:schemeClr val="dk1"/>
               </a:solidFill>
@@ -10147,7 +10411,7 @@
       </p:sp>
       <p:sp>
         <p:nvSpPr>
-          <p:cNvPr id="41" name="Google Shape;41;p1"/>
+          <p:cNvPr id="42" name="Google Shape;42;p1"/>
           <p:cNvSpPr txBox="1"/>
           <p:nvPr>
             <p:ph idx="1" type="body"/>
@@ -10155,8 +10419,8 @@
         </p:nvSpPr>
         <p:spPr>
           <a:xfrm>
-            <a:off x="459674" y="6378481"/>
-            <a:ext cx="10056900" cy="10148100"/>
+            <a:off x="459675" y="6378476"/>
+            <a:ext cx="10056900" cy="12075300"/>
           </a:xfrm>
           <a:prstGeom prst="rect">
             <a:avLst/>
@@ -10172,7 +10436,7 @@
           </a:bodyPr>
           <a:lstStyle/>
           <a:p>
-            <a:pPr indent="0" lvl="0" marL="0" rtl="0" algn="ctr">
+            <a:pPr indent="-419100" lvl="0" marL="457200" rtl="0" algn="l">
               <a:lnSpc>
                 <a:spcPct val="115000"/>
               </a:lnSpc>
@@ -10183,13 +10447,14 @@
                 <a:spcPts val="0"/>
               </a:spcAft>
               <a:buClr>
-                <a:schemeClr val="dk1"/>
-              </a:buClr>
-              <a:buSzPts val="1100"/>
-              <a:buNone/>
+                <a:srgbClr val="1F3864"/>
+              </a:buClr>
+              <a:buSzPts val="3000"/>
+              <a:buFont typeface="Arial"/>
+              <a:buChar char="●"/>
             </a:pPr>
             <a:r>
-              <a:rPr lang="en-US" sz="2900">
+              <a:rPr lang="en-US" sz="3000">
                 <a:solidFill>
                   <a:srgbClr val="1F3864"/>
                 </a:solidFill>
@@ -10198,9 +10463,200 @@
                 <a:cs typeface="Arial"/>
                 <a:sym typeface="Arial"/>
               </a:rPr>
-              <a:t>SIFT or Submitty Instant Feedback and Testing is a standalone app that enables students to autograde their Submitty coding homework assignments without having to rely on Submitty. Oftentimes, working with the Submitty autograder to test and find problems in code can be cumbersome, requiring the user to upload all their files, wait for the servers to process and run them, and then getting your output, all while using up a precious submission. SIFT aims to fix this by giving students the tools to get their homeworks graded on their own computers. Users begin by selecting the language they are using, upload their own source code files, and the expected output files. SIFT then runs the source code and shows the user the comparison between their output and the expected output that was provided in a similar way to Submitty. The goal of SIFT is to streamline the process of creating and testing code so that students spend less time waiting for Submitty, wasting submissions, and can instead get quick results and keep working</a:t>
+              <a:t>SIFT or Submitty Instant Feedback and Testing is a standalone app that enables students to autograde their Submitty coding homework assignments without having to rely on Submitty</a:t>
             </a:r>
-            <a:endParaRPr sz="2900">
+            <a:endParaRPr sz="3000">
+              <a:latin typeface="Arial"/>
+              <a:ea typeface="Arial"/>
+              <a:cs typeface="Arial"/>
+              <a:sym typeface="Arial"/>
+            </a:endParaRPr>
+          </a:p>
+          <a:p>
+            <a:pPr indent="-419100" lvl="0" marL="457200" rtl="0" algn="l">
+              <a:lnSpc>
+                <a:spcPct val="115000"/>
+              </a:lnSpc>
+              <a:spcBef>
+                <a:spcPts val="0"/>
+              </a:spcBef>
+              <a:spcAft>
+                <a:spcPts val="0"/>
+              </a:spcAft>
+              <a:buClr>
+                <a:srgbClr val="1F3864"/>
+              </a:buClr>
+              <a:buSzPts val="3000"/>
+              <a:buFont typeface="Arial"/>
+              <a:buChar char="●"/>
+            </a:pPr>
+            <a:r>
+              <a:rPr lang="en-US" sz="3000">
+                <a:solidFill>
+                  <a:srgbClr val="1F3864"/>
+                </a:solidFill>
+                <a:latin typeface="Arial"/>
+                <a:ea typeface="Arial"/>
+                <a:cs typeface="Arial"/>
+                <a:sym typeface="Arial"/>
+              </a:rPr>
+              <a:t>Oftentimes, working with the Submitty autograder to test and find problems in code can be cumbersome, requiring the user to upload all their files, wait for the servers to process and run them, and then getting your output, all while using up a precious submission</a:t>
+            </a:r>
+            <a:endParaRPr sz="3000">
+              <a:latin typeface="Arial"/>
+              <a:ea typeface="Arial"/>
+              <a:cs typeface="Arial"/>
+              <a:sym typeface="Arial"/>
+            </a:endParaRPr>
+          </a:p>
+          <a:p>
+            <a:pPr indent="-419100" lvl="0" marL="457200" rtl="0" algn="l">
+              <a:lnSpc>
+                <a:spcPct val="115000"/>
+              </a:lnSpc>
+              <a:spcBef>
+                <a:spcPts val="0"/>
+              </a:spcBef>
+              <a:spcAft>
+                <a:spcPts val="0"/>
+              </a:spcAft>
+              <a:buClr>
+                <a:srgbClr val="1F3864"/>
+              </a:buClr>
+              <a:buSzPts val="3000"/>
+              <a:buFont typeface="Arial"/>
+              <a:buChar char="●"/>
+            </a:pPr>
+            <a:r>
+              <a:rPr lang="en-US" sz="3000">
+                <a:solidFill>
+                  <a:srgbClr val="1F3864"/>
+                </a:solidFill>
+                <a:latin typeface="Arial"/>
+                <a:ea typeface="Arial"/>
+                <a:cs typeface="Arial"/>
+                <a:sym typeface="Arial"/>
+              </a:rPr>
+              <a:t>SIFT aims to fix this by giving students the tools to get their homeworks graded on their own computers.</a:t>
+            </a:r>
+            <a:endParaRPr sz="3000">
+              <a:latin typeface="Arial"/>
+              <a:ea typeface="Arial"/>
+              <a:cs typeface="Arial"/>
+              <a:sym typeface="Arial"/>
+            </a:endParaRPr>
+          </a:p>
+          <a:p>
+            <a:pPr indent="-419100" lvl="1" marL="914400" rtl="0" algn="l">
+              <a:lnSpc>
+                <a:spcPct val="115000"/>
+              </a:lnSpc>
+              <a:spcBef>
+                <a:spcPts val="0"/>
+              </a:spcBef>
+              <a:spcAft>
+                <a:spcPts val="0"/>
+              </a:spcAft>
+              <a:buClr>
+                <a:srgbClr val="1F3864"/>
+              </a:buClr>
+              <a:buSzPts val="3000"/>
+              <a:buFont typeface="Arial"/>
+              <a:buChar char="○"/>
+            </a:pPr>
+            <a:r>
+              <a:rPr lang="en-US" sz="3000">
+                <a:solidFill>
+                  <a:srgbClr val="1F3864"/>
+                </a:solidFill>
+                <a:latin typeface="Arial"/>
+                <a:ea typeface="Arial"/>
+                <a:cs typeface="Arial"/>
+                <a:sym typeface="Arial"/>
+              </a:rPr>
+              <a:t>Users begin by selecting the language they are using, upload their own source code files, and the expected output files</a:t>
+            </a:r>
+            <a:endParaRPr sz="3000">
+              <a:solidFill>
+                <a:srgbClr val="1F3864"/>
+              </a:solidFill>
+              <a:latin typeface="Arial"/>
+              <a:ea typeface="Arial"/>
+              <a:cs typeface="Arial"/>
+              <a:sym typeface="Arial"/>
+            </a:endParaRPr>
+          </a:p>
+          <a:p>
+            <a:pPr indent="-419100" lvl="1" marL="914400" rtl="0" algn="l">
+              <a:lnSpc>
+                <a:spcPct val="115000"/>
+              </a:lnSpc>
+              <a:spcBef>
+                <a:spcPts val="0"/>
+              </a:spcBef>
+              <a:spcAft>
+                <a:spcPts val="0"/>
+              </a:spcAft>
+              <a:buClr>
+                <a:srgbClr val="1F3864"/>
+              </a:buClr>
+              <a:buSzPts val="3000"/>
+              <a:buFont typeface="Arial"/>
+              <a:buChar char="○"/>
+            </a:pPr>
+            <a:r>
+              <a:rPr lang="en-US" sz="3000">
+                <a:solidFill>
+                  <a:srgbClr val="1F3864"/>
+                </a:solidFill>
+                <a:latin typeface="Arial"/>
+                <a:ea typeface="Arial"/>
+                <a:cs typeface="Arial"/>
+                <a:sym typeface="Arial"/>
+              </a:rPr>
+              <a:t>SIFT then runs the source code and shows the user the comparison between their output and the expected output that was provided in a similar way to Submitty</a:t>
+            </a:r>
+            <a:endParaRPr sz="3000">
+              <a:solidFill>
+                <a:srgbClr val="1F3864"/>
+              </a:solidFill>
+              <a:latin typeface="Arial"/>
+              <a:ea typeface="Arial"/>
+              <a:cs typeface="Arial"/>
+              <a:sym typeface="Arial"/>
+            </a:endParaRPr>
+          </a:p>
+          <a:p>
+            <a:pPr indent="-419100" lvl="0" marL="457200" rtl="0" algn="l">
+              <a:lnSpc>
+                <a:spcPct val="115000"/>
+              </a:lnSpc>
+              <a:spcBef>
+                <a:spcPts val="0"/>
+              </a:spcBef>
+              <a:spcAft>
+                <a:spcPts val="0"/>
+              </a:spcAft>
+              <a:buClr>
+                <a:srgbClr val="1F3864"/>
+              </a:buClr>
+              <a:buSzPts val="3000"/>
+              <a:buFont typeface="Arial"/>
+              <a:buChar char="●"/>
+            </a:pPr>
+            <a:r>
+              <a:rPr lang="en-US" sz="3000">
+                <a:solidFill>
+                  <a:srgbClr val="1F3864"/>
+                </a:solidFill>
+                <a:latin typeface="Arial"/>
+                <a:ea typeface="Arial"/>
+                <a:cs typeface="Arial"/>
+                <a:sym typeface="Arial"/>
+              </a:rPr>
+              <a:t>The goal of SIFT is to streamline the process of creating and testing code so that students spend less time waiting for Submitty, wasting submissions, and can instead get quick results and keep working</a:t>
+            </a:r>
+            <a:endParaRPr sz="3000">
               <a:solidFill>
                 <a:srgbClr val="1F3864"/>
               </a:solidFill>
@@ -10214,7 +10670,7 @@
       </p:sp>
       <p:sp>
         <p:nvSpPr>
-          <p:cNvPr id="42" name="Google Shape;42;p1"/>
+          <p:cNvPr id="43" name="Google Shape;43;p1"/>
           <p:cNvSpPr txBox="1"/>
           <p:nvPr>
             <p:ph idx="2" type="body"/>
@@ -10272,7 +10728,7 @@
       </p:sp>
       <p:sp>
         <p:nvSpPr>
-          <p:cNvPr id="43" name="Google Shape;43;p1"/>
+          <p:cNvPr id="44" name="Google Shape;44;p1"/>
           <p:cNvSpPr txBox="1"/>
           <p:nvPr>
             <p:ph idx="3" type="body"/>
@@ -10280,7 +10736,7 @@
         </p:nvSpPr>
         <p:spPr>
           <a:xfrm>
-            <a:off x="462825" y="16602613"/>
+            <a:off x="17410138" y="16551313"/>
             <a:ext cx="10050600" cy="877200"/>
           </a:xfrm>
           <a:prstGeom prst="rect">
@@ -10320,271 +10776,6 @@
               <a:t>Visuals</a:t>
             </a:r>
             <a:endParaRPr sz="4500">
-              <a:latin typeface="Helvetica Neue"/>
-              <a:ea typeface="Helvetica Neue"/>
-              <a:cs typeface="Helvetica Neue"/>
-              <a:sym typeface="Helvetica Neue"/>
-            </a:endParaRPr>
-          </a:p>
-        </p:txBody>
-      </p:sp>
-      <p:sp>
-        <p:nvSpPr>
-          <p:cNvPr id="44" name="Google Shape;44;p1"/>
-          <p:cNvSpPr txBox="1"/>
-          <p:nvPr>
-            <p:ph idx="4" type="body"/>
-          </p:nvPr>
-        </p:nvSpPr>
-        <p:spPr>
-          <a:xfrm>
-            <a:off x="11460161" y="6378481"/>
-            <a:ext cx="10048800" cy="5014800"/>
-          </a:xfrm>
-          <a:prstGeom prst="rect">
-            <a:avLst/>
-          </a:prstGeom>
-          <a:noFill/>
-          <a:ln>
-            <a:noFill/>
-          </a:ln>
-        </p:spPr>
-        <p:txBody>
-          <a:bodyPr anchorCtr="0" anchor="t" bIns="228575" lIns="228575" spcFirstLastPara="1" rIns="228575" wrap="square" tIns="228575">
-            <a:spAutoFit/>
-          </a:bodyPr>
-          <a:lstStyle/>
-          <a:p>
-            <a:pPr indent="-412750" lvl="0" marL="457200" rtl="0" algn="l">
-              <a:lnSpc>
-                <a:spcPct val="115000"/>
-              </a:lnSpc>
-              <a:spcBef>
-                <a:spcPts val="0"/>
-              </a:spcBef>
-              <a:spcAft>
-                <a:spcPts val="0"/>
-              </a:spcAft>
-              <a:buClr>
-                <a:schemeClr val="dk1"/>
-              </a:buClr>
-              <a:buSzPts val="2900"/>
-              <a:buFont typeface="Helvetica Neue"/>
-              <a:buChar char="●"/>
-            </a:pPr>
-            <a:r>
-              <a:rPr lang="en-US" sz="2900">
-                <a:solidFill>
-                  <a:schemeClr val="dk1"/>
-                </a:solidFill>
-                <a:latin typeface="Helvetica Neue"/>
-                <a:ea typeface="Helvetica Neue"/>
-                <a:cs typeface="Helvetica Neue"/>
-                <a:sym typeface="Helvetica Neue"/>
-              </a:rPr>
-              <a:t>Provide students with a resource to quickly and easily test code anywhere, anytime</a:t>
-            </a:r>
-            <a:endParaRPr sz="2900">
-              <a:solidFill>
-                <a:schemeClr val="dk1"/>
-              </a:solidFill>
-              <a:latin typeface="Helvetica Neue"/>
-              <a:ea typeface="Helvetica Neue"/>
-              <a:cs typeface="Helvetica Neue"/>
-              <a:sym typeface="Helvetica Neue"/>
-            </a:endParaRPr>
-          </a:p>
-          <a:p>
-            <a:pPr indent="-412750" lvl="0" marL="457200" rtl="0" algn="l">
-              <a:lnSpc>
-                <a:spcPct val="115000"/>
-              </a:lnSpc>
-              <a:spcBef>
-                <a:spcPts val="0"/>
-              </a:spcBef>
-              <a:spcAft>
-                <a:spcPts val="0"/>
-              </a:spcAft>
-              <a:buClr>
-                <a:schemeClr val="dk1"/>
-              </a:buClr>
-              <a:buSzPts val="2900"/>
-              <a:buFont typeface="Helvetica Neue"/>
-              <a:buChar char="●"/>
-            </a:pPr>
-            <a:r>
-              <a:rPr lang="en-US" sz="2900">
-                <a:solidFill>
-                  <a:schemeClr val="dk1"/>
-                </a:solidFill>
-                <a:latin typeface="Helvetica Neue"/>
-                <a:ea typeface="Helvetica Neue"/>
-                <a:cs typeface="Helvetica Neue"/>
-                <a:sym typeface="Helvetica Neue"/>
-              </a:rPr>
-              <a:t>Create a user friendly and functional UI</a:t>
-            </a:r>
-            <a:endParaRPr sz="2900">
-              <a:solidFill>
-                <a:schemeClr val="dk1"/>
-              </a:solidFill>
-              <a:latin typeface="Helvetica Neue"/>
-              <a:ea typeface="Helvetica Neue"/>
-              <a:cs typeface="Helvetica Neue"/>
-              <a:sym typeface="Helvetica Neue"/>
-            </a:endParaRPr>
-          </a:p>
-          <a:p>
-            <a:pPr indent="-412750" lvl="0" marL="457200" rtl="0" algn="l">
-              <a:lnSpc>
-                <a:spcPct val="115000"/>
-              </a:lnSpc>
-              <a:spcBef>
-                <a:spcPts val="0"/>
-              </a:spcBef>
-              <a:spcAft>
-                <a:spcPts val="0"/>
-              </a:spcAft>
-              <a:buClr>
-                <a:schemeClr val="dk1"/>
-              </a:buClr>
-              <a:buSzPts val="2900"/>
-              <a:buFont typeface="Helvetica Neue"/>
-              <a:buChar char="●"/>
-            </a:pPr>
-            <a:r>
-              <a:rPr lang="en-US" sz="2900">
-                <a:solidFill>
-                  <a:schemeClr val="dk1"/>
-                </a:solidFill>
-                <a:latin typeface="Helvetica Neue"/>
-                <a:ea typeface="Helvetica Neue"/>
-                <a:cs typeface="Helvetica Neue"/>
-                <a:sym typeface="Helvetica Neue"/>
-              </a:rPr>
-              <a:t>Learn how to run code written in different languages within Python</a:t>
-            </a:r>
-            <a:endParaRPr sz="2900">
-              <a:solidFill>
-                <a:schemeClr val="dk1"/>
-              </a:solidFill>
-              <a:latin typeface="Helvetica Neue"/>
-              <a:ea typeface="Helvetica Neue"/>
-              <a:cs typeface="Helvetica Neue"/>
-              <a:sym typeface="Helvetica Neue"/>
-            </a:endParaRPr>
-          </a:p>
-          <a:p>
-            <a:pPr indent="-412750" lvl="0" marL="457200" rtl="0" algn="l">
-              <a:lnSpc>
-                <a:spcPct val="115000"/>
-              </a:lnSpc>
-              <a:spcBef>
-                <a:spcPts val="0"/>
-              </a:spcBef>
-              <a:spcAft>
-                <a:spcPts val="0"/>
-              </a:spcAft>
-              <a:buClr>
-                <a:schemeClr val="dk1"/>
-              </a:buClr>
-              <a:buSzPts val="2900"/>
-              <a:buFont typeface="Helvetica Neue"/>
-              <a:buChar char="●"/>
-            </a:pPr>
-            <a:r>
-              <a:rPr lang="en-US" sz="2900">
-                <a:solidFill>
-                  <a:schemeClr val="dk1"/>
-                </a:solidFill>
-                <a:latin typeface="Helvetica Neue"/>
-                <a:ea typeface="Helvetica Neue"/>
-                <a:cs typeface="Helvetica Neue"/>
-                <a:sym typeface="Helvetica Neue"/>
-              </a:rPr>
-              <a:t>Encourage students to develop better testing habits</a:t>
-            </a:r>
-            <a:endParaRPr sz="2900">
-              <a:solidFill>
-                <a:schemeClr val="dk1"/>
-              </a:solidFill>
-              <a:latin typeface="Helvetica Neue"/>
-              <a:ea typeface="Helvetica Neue"/>
-              <a:cs typeface="Helvetica Neue"/>
-              <a:sym typeface="Helvetica Neue"/>
-            </a:endParaRPr>
-          </a:p>
-          <a:p>
-            <a:pPr indent="-412750" lvl="0" marL="457200" rtl="0" algn="l">
-              <a:lnSpc>
-                <a:spcPct val="115000"/>
-              </a:lnSpc>
-              <a:spcBef>
-                <a:spcPts val="0"/>
-              </a:spcBef>
-              <a:spcAft>
-                <a:spcPts val="0"/>
-              </a:spcAft>
-              <a:buClr>
-                <a:schemeClr val="dk1"/>
-              </a:buClr>
-              <a:buSzPts val="2900"/>
-              <a:buFont typeface="Helvetica Neue"/>
-              <a:buChar char="●"/>
-            </a:pPr>
-            <a:r>
-              <a:rPr lang="en-US" sz="2900">
-                <a:solidFill>
-                  <a:schemeClr val="dk1"/>
-                </a:solidFill>
-                <a:latin typeface="Helvetica Neue"/>
-                <a:ea typeface="Helvetica Neue"/>
-                <a:cs typeface="Helvetica Neue"/>
-                <a:sym typeface="Helvetica Neue"/>
-              </a:rPr>
-              <a:t>Relieve stress off Submitty servers</a:t>
-            </a:r>
-            <a:endParaRPr sz="2900">
-              <a:solidFill>
-                <a:schemeClr val="dk1"/>
-              </a:solidFill>
-              <a:latin typeface="Helvetica Neue"/>
-              <a:ea typeface="Helvetica Neue"/>
-              <a:cs typeface="Helvetica Neue"/>
-              <a:sym typeface="Helvetica Neue"/>
-            </a:endParaRPr>
-          </a:p>
-          <a:p>
-            <a:pPr indent="-412750" lvl="0" marL="457200" rtl="0" algn="l">
-              <a:lnSpc>
-                <a:spcPct val="115000"/>
-              </a:lnSpc>
-              <a:spcBef>
-                <a:spcPts val="0"/>
-              </a:spcBef>
-              <a:spcAft>
-                <a:spcPts val="0"/>
-              </a:spcAft>
-              <a:buClr>
-                <a:schemeClr val="dk1"/>
-              </a:buClr>
-              <a:buSzPts val="2900"/>
-              <a:buFont typeface="Helvetica Neue"/>
-              <a:buChar char="●"/>
-            </a:pPr>
-            <a:r>
-              <a:rPr lang="en-US" sz="2900">
-                <a:solidFill>
-                  <a:schemeClr val="dk1"/>
-                </a:solidFill>
-                <a:latin typeface="Helvetica Neue"/>
-                <a:ea typeface="Helvetica Neue"/>
-                <a:cs typeface="Helvetica Neue"/>
-                <a:sym typeface="Helvetica Neue"/>
-              </a:rPr>
-              <a:t>Apply the skills we’ve learned to create a useful product</a:t>
-            </a:r>
-            <a:endParaRPr sz="2900">
               <a:latin typeface="Helvetica Neue"/>
               <a:ea typeface="Helvetica Neue"/>
               <a:cs typeface="Helvetica Neue"/>
@@ -10777,7 +10968,7 @@
         </p:nvSpPr>
         <p:spPr>
           <a:xfrm>
-            <a:off x="33387742" y="20460913"/>
+            <a:off x="33387742" y="19165513"/>
             <a:ext cx="10047000" cy="877200"/>
           </a:xfrm>
           <a:prstGeom prst="rect">
@@ -10814,7 +11005,7 @@
                 <a:cs typeface="Helvetica Neue"/>
                 <a:sym typeface="Helvetica Neue"/>
               </a:rPr>
-              <a:t>Accomplishments and Future Goals</a:t>
+              <a:t>Future Goals</a:t>
             </a:r>
             <a:endParaRPr sz="4500">
               <a:latin typeface="Helvetica Neue"/>
@@ -10841,8 +11032,8 @@
         </p:blipFill>
         <p:spPr>
           <a:xfrm>
-            <a:off x="33293350" y="21215125"/>
-            <a:ext cx="10219900" cy="6018676"/>
+            <a:off x="33293350" y="19919725"/>
+            <a:ext cx="10219900" cy="6751750"/>
           </a:xfrm>
           <a:prstGeom prst="rect">
             <a:avLst/>
@@ -10863,8 +11054,8 @@
         </p:nvSpPr>
         <p:spPr>
           <a:xfrm>
-            <a:off x="33387750" y="21199575"/>
-            <a:ext cx="10052100" cy="6064500"/>
+            <a:off x="33387750" y="19827975"/>
+            <a:ext cx="10052100" cy="6926400"/>
           </a:xfrm>
           <a:prstGeom prst="rect">
             <a:avLst/>
@@ -10895,7 +11086,7 @@
               <a:buNone/>
             </a:pPr>
             <a:r>
-              <a:rPr lang="en-US" sz="2800">
+              <a:rPr lang="en-US" sz="3000">
                 <a:latin typeface="Helvetica Neue"/>
                 <a:ea typeface="Helvetica Neue"/>
                 <a:cs typeface="Helvetica Neue"/>
@@ -10903,7 +11094,7 @@
               </a:rPr>
               <a:t>Some of the ideas and goals we have for the future include:</a:t>
             </a:r>
-            <a:endParaRPr sz="2800">
+            <a:endParaRPr sz="3000">
               <a:latin typeface="Helvetica Neue"/>
               <a:ea typeface="Helvetica Neue"/>
               <a:cs typeface="Helvetica Neue"/>
@@ -10911,19 +11102,19 @@
             </a:endParaRPr>
           </a:p>
           <a:p>
-            <a:pPr indent="-406400" lvl="0" marL="457200" rtl="0" algn="l">
-              <a:spcBef>
-                <a:spcPts val="0"/>
-              </a:spcBef>
-              <a:spcAft>
-                <a:spcPts val="0"/>
-              </a:spcAft>
-              <a:buSzPts val="2800"/>
+            <a:pPr indent="-419100" lvl="0" marL="457200" rtl="0" algn="l">
+              <a:spcBef>
+                <a:spcPts val="0"/>
+              </a:spcBef>
+              <a:spcAft>
+                <a:spcPts val="0"/>
+              </a:spcAft>
+              <a:buSzPts val="3000"/>
               <a:buFont typeface="Helvetica Neue"/>
               <a:buChar char="●"/>
             </a:pPr>
             <a:r>
-              <a:rPr lang="en-US" sz="2800">
+              <a:rPr lang="en-US" sz="3000">
                 <a:latin typeface="Helvetica Neue"/>
                 <a:ea typeface="Helvetica Neue"/>
                 <a:cs typeface="Helvetica Neue"/>
@@ -10931,7 +11122,7 @@
               </a:rPr>
               <a:t>Allowing users to select individual courses and have all the necessary resources already available for them without extra downloads</a:t>
             </a:r>
-            <a:endParaRPr sz="2800">
+            <a:endParaRPr sz="3000">
               <a:latin typeface="Helvetica Neue"/>
               <a:ea typeface="Helvetica Neue"/>
               <a:cs typeface="Helvetica Neue"/>
@@ -10939,19 +11130,19 @@
             </a:endParaRPr>
           </a:p>
           <a:p>
-            <a:pPr indent="-406400" lvl="0" marL="457200" rtl="0" algn="l">
-              <a:spcBef>
-                <a:spcPts val="0"/>
-              </a:spcBef>
-              <a:spcAft>
-                <a:spcPts val="0"/>
-              </a:spcAft>
-              <a:buSzPts val="2800"/>
+            <a:pPr indent="-419100" lvl="0" marL="457200" rtl="0" algn="l">
+              <a:spcBef>
+                <a:spcPts val="0"/>
+              </a:spcBef>
+              <a:spcAft>
+                <a:spcPts val="0"/>
+              </a:spcAft>
+              <a:buSzPts val="3000"/>
               <a:buFont typeface="Helvetica Neue"/>
               <a:buChar char="●"/>
             </a:pPr>
             <a:r>
-              <a:rPr lang="en-US" sz="2800">
+              <a:rPr lang="en-US" sz="3000">
                 <a:latin typeface="Helvetica Neue"/>
                 <a:ea typeface="Helvetica Neue"/>
                 <a:cs typeface="Helvetica Neue"/>
@@ -10959,7 +11150,7 @@
               </a:rPr>
               <a:t>Allowing professors to upload materials and manage their courses on the app to allow the features mentioned above</a:t>
             </a:r>
-            <a:endParaRPr sz="2800">
+            <a:endParaRPr sz="3000">
               <a:latin typeface="Helvetica Neue"/>
               <a:ea typeface="Helvetica Neue"/>
               <a:cs typeface="Helvetica Neue"/>
@@ -10967,19 +11158,19 @@
             </a:endParaRPr>
           </a:p>
           <a:p>
-            <a:pPr indent="-406400" lvl="0" marL="457200" rtl="0" algn="l">
-              <a:spcBef>
-                <a:spcPts val="0"/>
-              </a:spcBef>
-              <a:spcAft>
-                <a:spcPts val="0"/>
-              </a:spcAft>
-              <a:buSzPts val="2800"/>
+            <a:pPr indent="-419100" lvl="0" marL="457200" rtl="0" algn="l">
+              <a:spcBef>
+                <a:spcPts val="0"/>
+              </a:spcBef>
+              <a:spcAft>
+                <a:spcPts val="0"/>
+              </a:spcAft>
+              <a:buSzPts val="3000"/>
               <a:buFont typeface="Helvetica Neue"/>
               <a:buChar char="●"/>
             </a:pPr>
             <a:r>
-              <a:rPr lang="en-US" sz="2800">
+              <a:rPr lang="en-US" sz="3000">
                 <a:latin typeface="Helvetica Neue"/>
                 <a:ea typeface="Helvetica Neue"/>
                 <a:cs typeface="Helvetica Neue"/>
@@ -10987,7 +11178,7 @@
               </a:rPr>
               <a:t>Incorporate AI for giving users feedback and tips on how to improve their code/coding habits</a:t>
             </a:r>
-            <a:endParaRPr sz="2800">
+            <a:endParaRPr sz="3000">
               <a:latin typeface="Helvetica Neue"/>
               <a:ea typeface="Helvetica Neue"/>
               <a:cs typeface="Helvetica Neue"/>
@@ -10995,19 +11186,19 @@
             </a:endParaRPr>
           </a:p>
           <a:p>
-            <a:pPr indent="-406400" lvl="0" marL="457200" rtl="0" algn="l">
-              <a:spcBef>
-                <a:spcPts val="0"/>
-              </a:spcBef>
-              <a:spcAft>
-                <a:spcPts val="0"/>
-              </a:spcAft>
-              <a:buSzPts val="2800"/>
+            <a:pPr indent="-419100" lvl="0" marL="457200" rtl="0" algn="l">
+              <a:spcBef>
+                <a:spcPts val="0"/>
+              </a:spcBef>
+              <a:spcAft>
+                <a:spcPts val="0"/>
+              </a:spcAft>
+              <a:buSzPts val="3000"/>
               <a:buFont typeface="Helvetica Neue"/>
               <a:buChar char="●"/>
             </a:pPr>
             <a:r>
-              <a:rPr lang="en-US" sz="2800">
+              <a:rPr lang="en-US" sz="3000">
                 <a:latin typeface="Helvetica Neue"/>
                 <a:ea typeface="Helvetica Neue"/>
                 <a:cs typeface="Helvetica Neue"/>
@@ -11015,7 +11206,7 @@
               </a:rPr>
               <a:t>Possibly creating a better UI from scratch for more control and more flexible aesthetics</a:t>
             </a:r>
-            <a:endParaRPr sz="2800">
+            <a:endParaRPr sz="3000">
               <a:latin typeface="Helvetica Neue"/>
               <a:ea typeface="Helvetica Neue"/>
               <a:cs typeface="Helvetica Neue"/>
@@ -11023,19 +11214,19 @@
             </a:endParaRPr>
           </a:p>
           <a:p>
-            <a:pPr indent="-406400" lvl="0" marL="457200" rtl="0" algn="l">
-              <a:spcBef>
-                <a:spcPts val="0"/>
-              </a:spcBef>
-              <a:spcAft>
-                <a:spcPts val="0"/>
-              </a:spcAft>
-              <a:buSzPts val="2800"/>
+            <a:pPr indent="-419100" lvl="0" marL="457200" rtl="0" algn="l">
+              <a:spcBef>
+                <a:spcPts val="0"/>
+              </a:spcBef>
+              <a:spcAft>
+                <a:spcPts val="0"/>
+              </a:spcAft>
+              <a:buSzPts val="3000"/>
               <a:buFont typeface="Helvetica Neue"/>
               <a:buChar char="●"/>
             </a:pPr>
             <a:r>
-              <a:rPr lang="en-US" sz="2800">
+              <a:rPr lang="en-US" sz="3000">
                 <a:latin typeface="Helvetica Neue"/>
                 <a:ea typeface="Helvetica Neue"/>
                 <a:cs typeface="Helvetica Neue"/>
@@ -11044,7 +11235,7 @@
               <a:t>Make </a:t>
             </a:r>
             <a:r>
-              <a:rPr lang="en-US" sz="2800">
+              <a:rPr lang="en-US" sz="3000">
                 <a:latin typeface="Helvetica Neue"/>
                 <a:ea typeface="Helvetica Neue"/>
                 <a:cs typeface="Helvetica Neue"/>
@@ -11053,7 +11244,7 @@
               <a:t>the</a:t>
             </a:r>
             <a:r>
-              <a:rPr lang="en-US" sz="2800">
+              <a:rPr lang="en-US" sz="3000">
                 <a:latin typeface="Helvetica Neue"/>
                 <a:ea typeface="Helvetica Neue"/>
                 <a:cs typeface="Helvetica Neue"/>
@@ -11061,7 +11252,7 @@
               </a:rPr>
               <a:t> app distributable (through platforms such as Docker)</a:t>
             </a:r>
-            <a:endParaRPr sz="2800">
+            <a:endParaRPr sz="3000">
               <a:latin typeface="Helvetica Neue"/>
               <a:ea typeface="Helvetica Neue"/>
               <a:cs typeface="Helvetica Neue"/>
@@ -11145,7 +11336,7 @@
         <p:spPr>
           <a:xfrm>
             <a:off x="33319450" y="28293400"/>
-            <a:ext cx="10219900" cy="2001000"/>
+            <a:ext cx="10219900" cy="2516701"/>
           </a:xfrm>
           <a:prstGeom prst="rect">
             <a:avLst/>
@@ -11166,8 +11357,8 @@
         </p:nvSpPr>
         <p:spPr>
           <a:xfrm>
-            <a:off x="33390292" y="28338446"/>
-            <a:ext cx="10052100" cy="2174100"/>
+            <a:off x="33466500" y="28338451"/>
+            <a:ext cx="10052100" cy="2516700"/>
           </a:xfrm>
           <a:prstGeom prst="rect">
             <a:avLst/>
@@ -11183,7 +11374,7 @@
           </a:bodyPr>
           <a:lstStyle/>
           <a:p>
-            <a:pPr indent="-387350" lvl="0" marL="457200" rtl="0" algn="l">
+            <a:pPr indent="-419100" lvl="0" marL="457200" rtl="0" algn="l">
               <a:lnSpc>
                 <a:spcPct val="115000"/>
               </a:lnSpc>
@@ -11193,12 +11384,12 @@
               <a:spcAft>
                 <a:spcPts val="0"/>
               </a:spcAft>
-              <a:buSzPts val="2500"/>
+              <a:buSzPts val="3000"/>
               <a:buFont typeface="Helvetica Neue"/>
               <a:buChar char="●"/>
             </a:pPr>
             <a:r>
-              <a:rPr lang="en-US">
+              <a:rPr lang="en-US" sz="3000">
                 <a:latin typeface="Helvetica Neue"/>
                 <a:ea typeface="Helvetica Neue"/>
                 <a:cs typeface="Helvetica Neue"/>
@@ -11206,7 +11397,7 @@
               </a:rPr>
               <a:t>CustomTkInter by Tom Schimansky</a:t>
             </a:r>
-            <a:endParaRPr>
+            <a:endParaRPr sz="3000">
               <a:latin typeface="Helvetica Neue"/>
               <a:ea typeface="Helvetica Neue"/>
               <a:cs typeface="Helvetica Neue"/>
@@ -11214,7 +11405,7 @@
             </a:endParaRPr>
           </a:p>
           <a:p>
-            <a:pPr indent="-387350" lvl="0" marL="457200" rtl="0" algn="l">
+            <a:pPr indent="-419100" lvl="0" marL="457200" rtl="0" algn="l">
               <a:lnSpc>
                 <a:spcPct val="115000"/>
               </a:lnSpc>
@@ -11224,12 +11415,43 @@
               <a:spcAft>
                 <a:spcPts val="0"/>
               </a:spcAft>
-              <a:buSzPts val="2500"/>
+              <a:buSzPts val="3000"/>
               <a:buFont typeface="Helvetica Neue"/>
               <a:buChar char="●"/>
             </a:pPr>
             <a:r>
-              <a:rPr lang="en-US">
+              <a:rPr lang="en-US" sz="3000">
+                <a:latin typeface="Helvetica Neue"/>
+                <a:ea typeface="Helvetica Neue"/>
+                <a:cs typeface="Helvetica Neue"/>
+                <a:sym typeface="Helvetica Neue"/>
+              </a:rPr>
+              <a:t>TkInter by Steen Lumholt and Guido van Rossum</a:t>
+            </a:r>
+            <a:endParaRPr sz="3000">
+              <a:latin typeface="Helvetica Neue"/>
+              <a:ea typeface="Helvetica Neue"/>
+              <a:cs typeface="Helvetica Neue"/>
+              <a:sym typeface="Helvetica Neue"/>
+            </a:endParaRPr>
+          </a:p>
+          <a:p>
+            <a:pPr indent="-419100" lvl="0" marL="457200" rtl="0" algn="l">
+              <a:lnSpc>
+                <a:spcPct val="115000"/>
+              </a:lnSpc>
+              <a:spcBef>
+                <a:spcPts val="0"/>
+              </a:spcBef>
+              <a:spcAft>
+                <a:spcPts val="0"/>
+              </a:spcAft>
+              <a:buSzPts val="3000"/>
+              <a:buFont typeface="Helvetica Neue"/>
+              <a:buChar char="●"/>
+            </a:pPr>
+            <a:r>
+              <a:rPr lang="en-US" sz="3000">
                 <a:latin typeface="Helvetica Neue"/>
                 <a:ea typeface="Helvetica Neue"/>
                 <a:cs typeface="Helvetica Neue"/>
@@ -11237,7 +11459,7 @@
               </a:rPr>
               <a:t>Python by Guido van Rossum</a:t>
             </a:r>
-            <a:endParaRPr>
+            <a:endParaRPr sz="3000">
               <a:latin typeface="Helvetica Neue"/>
               <a:ea typeface="Helvetica Neue"/>
               <a:cs typeface="Helvetica Neue"/>
@@ -11245,7 +11467,7 @@
             </a:endParaRPr>
           </a:p>
           <a:p>
-            <a:pPr indent="-387350" lvl="0" marL="457200" rtl="0" algn="l">
+            <a:pPr indent="-419100" lvl="0" marL="457200" rtl="0" algn="l">
               <a:lnSpc>
                 <a:spcPct val="115000"/>
               </a:lnSpc>
@@ -11255,12 +11477,12 @@
               <a:spcAft>
                 <a:spcPts val="0"/>
               </a:spcAft>
-              <a:buSzPts val="2500"/>
+              <a:buSzPts val="3000"/>
               <a:buFont typeface="Helvetica Neue"/>
               <a:buChar char="●"/>
             </a:pPr>
             <a:r>
-              <a:rPr lang="en-US">
+              <a:rPr lang="en-US" sz="3000">
                 <a:latin typeface="Helvetica Neue"/>
                 <a:ea typeface="Helvetica Neue"/>
                 <a:cs typeface="Helvetica Neue"/>
@@ -11268,32 +11490,7 @@
               </a:rPr>
               <a:t>RCOS professors, coordinators, and mentors</a:t>
             </a:r>
-            <a:endParaRPr>
-              <a:latin typeface="Helvetica Neue"/>
-              <a:ea typeface="Helvetica Neue"/>
-              <a:cs typeface="Helvetica Neue"/>
-              <a:sym typeface="Helvetica Neue"/>
-            </a:endParaRPr>
-          </a:p>
-          <a:p>
-            <a:pPr indent="-387350" lvl="0" marL="457200" rtl="0" algn="l">
-              <a:lnSpc>
-                <a:spcPct val="115000"/>
-              </a:lnSpc>
-              <a:spcBef>
-                <a:spcPts val="0"/>
-              </a:spcBef>
-              <a:spcAft>
-                <a:spcPts val="0"/>
-              </a:spcAft>
-              <a:buSzPts val="2500"/>
-              <a:buFont typeface="Helvetica Neue"/>
-              <a:buChar char="●"/>
-            </a:pPr>
-            <a:r>
-              <a:t/>
-            </a:r>
-            <a:endParaRPr>
+            <a:endParaRPr sz="3000">
               <a:latin typeface="Helvetica Neue"/>
               <a:ea typeface="Helvetica Neue"/>
               <a:cs typeface="Helvetica Neue"/>
@@ -11483,6 +11680,34 @@
           <p:nvPr/>
         </p:nvPicPr>
         <p:blipFill>
+          <a:blip r:embed="rId4">
+            <a:alphaModFix amt="77000"/>
+          </a:blip>
+          <a:stretch>
+            <a:fillRect/>
+          </a:stretch>
+        </p:blipFill>
+        <p:spPr>
+          <a:xfrm>
+            <a:off x="22049375" y="6378475"/>
+            <a:ext cx="10219900" cy="10172851"/>
+          </a:xfrm>
+          <a:prstGeom prst="rect">
+            <a:avLst/>
+          </a:prstGeom>
+          <a:noFill/>
+          <a:ln>
+            <a:noFill/>
+          </a:ln>
+        </p:spPr>
+      </p:pic>
+      <p:pic>
+        <p:nvPicPr>
+          <p:cNvPr id="59" name="Google Shape;59;p1"/>
+          <p:cNvPicPr preferRelativeResize="0"/>
+          <p:nvPr/>
+        </p:nvPicPr>
+        <p:blipFill>
           <a:blip r:embed="rId7">
             <a:alphaModFix/>
           </a:blip>
@@ -11506,7 +11731,7 @@
       </p:pic>
       <p:pic>
         <p:nvPicPr>
-          <p:cNvPr id="59" name="Google Shape;59;p1"/>
+          <p:cNvPr id="60" name="Google Shape;60;p1"/>
           <p:cNvPicPr preferRelativeResize="0"/>
           <p:nvPr/>
         </p:nvPicPr>
@@ -11534,7 +11759,7 @@
       </p:pic>
       <p:pic>
         <p:nvPicPr>
-          <p:cNvPr id="60" name="Google Shape;60;p1"/>
+          <p:cNvPr id="61" name="Google Shape;61;p1"/>
           <p:cNvPicPr preferRelativeResize="0"/>
           <p:nvPr/>
         </p:nvPicPr>
@@ -11550,34 +11775,6 @@
           <a:xfrm>
             <a:off x="27374638" y="6534639"/>
             <a:ext cx="1371600" cy="1371600"/>
-          </a:xfrm>
-          <a:prstGeom prst="rect">
-            <a:avLst/>
-          </a:prstGeom>
-          <a:noFill/>
-          <a:ln>
-            <a:noFill/>
-          </a:ln>
-        </p:spPr>
-      </p:pic>
-      <p:pic>
-        <p:nvPicPr>
-          <p:cNvPr id="61" name="Google Shape;61;p1"/>
-          <p:cNvPicPr preferRelativeResize="0"/>
-          <p:nvPr/>
-        </p:nvPicPr>
-        <p:blipFill>
-          <a:blip r:embed="rId4">
-            <a:alphaModFix amt="77000"/>
-          </a:blip>
-          <a:stretch>
-            <a:fillRect/>
-          </a:stretch>
-        </p:blipFill>
-        <p:spPr>
-          <a:xfrm>
-            <a:off x="22049375" y="8141475"/>
-            <a:ext cx="10219900" cy="8195050"/>
           </a:xfrm>
           <a:prstGeom prst="rect">
             <a:avLst/>
@@ -11626,7 +11823,7 @@
         <p:spPr>
           <a:xfrm>
             <a:off x="22049381" y="6405031"/>
-            <a:ext cx="10048800" cy="10095000"/>
+            <a:ext cx="10048800" cy="10411500"/>
           </a:xfrm>
           <a:prstGeom prst="rect">
             <a:avLst/>
@@ -11721,7 +11918,7 @@
             <a:r>
               <a:t/>
             </a:r>
-            <a:endParaRPr sz="2800">
+            <a:endParaRPr sz="3000">
               <a:solidFill>
                 <a:schemeClr val="dk1"/>
               </a:solidFill>
@@ -11750,7 +11947,7 @@
               <a:buNone/>
             </a:pPr>
             <a:r>
-              <a:rPr lang="en-US" sz="2900">
+              <a:rPr lang="en-US" sz="3000">
                 <a:solidFill>
                   <a:schemeClr val="dk1"/>
                 </a:solidFill>
@@ -11761,7 +11958,7 @@
               </a:rPr>
               <a:t>One of our main goals with S.I.F.T was to make an easy-to-run, smooth application. As such:</a:t>
             </a:r>
-            <a:endParaRPr sz="2900">
+            <a:endParaRPr sz="3000">
               <a:solidFill>
                 <a:schemeClr val="dk1"/>
               </a:solidFill>
@@ -11772,7 +11969,7 @@
             </a:endParaRPr>
           </a:p>
           <a:p>
-            <a:pPr indent="-412750" lvl="0" marL="457200" rtl="0" algn="l">
+            <a:pPr indent="-419100" lvl="0" marL="457200" rtl="0" algn="l">
               <a:lnSpc>
                 <a:spcPct val="115000"/>
               </a:lnSpc>
@@ -11785,12 +11982,12 @@
               <a:buClr>
                 <a:schemeClr val="dk1"/>
               </a:buClr>
-              <a:buSzPts val="2900"/>
+              <a:buSzPts val="3000"/>
               <a:buFont typeface="Helvetica Neue"/>
               <a:buChar char="●"/>
             </a:pPr>
             <a:r>
-              <a:rPr lang="en-US" sz="2900">
+              <a:rPr lang="en-US" sz="3000">
                 <a:solidFill>
                   <a:schemeClr val="dk1"/>
                 </a:solidFill>
@@ -11801,7 +11998,7 @@
               </a:rPr>
               <a:t> We decided to run with python because of its extensive library support. Moreover, the whole team has experience in python, so it would make the development process smoother. </a:t>
             </a:r>
-            <a:endParaRPr sz="2900">
+            <a:endParaRPr sz="3000">
               <a:solidFill>
                 <a:schemeClr val="dk1"/>
               </a:solidFill>
@@ -11812,7 +12009,7 @@
             </a:endParaRPr>
           </a:p>
           <a:p>
-            <a:pPr indent="-412750" lvl="0" marL="457200" rtl="0" algn="l">
+            <a:pPr indent="-419100" lvl="0" marL="457200" rtl="0" algn="l">
               <a:lnSpc>
                 <a:spcPct val="115000"/>
               </a:lnSpc>
@@ -11825,12 +12022,12 @@
               <a:buClr>
                 <a:schemeClr val="dk1"/>
               </a:buClr>
-              <a:buSzPts val="2900"/>
+              <a:buSzPts val="3000"/>
               <a:buFont typeface="Helvetica Neue"/>
               <a:buChar char="●"/>
             </a:pPr>
             <a:r>
-              <a:rPr lang="en-US" sz="2900">
+              <a:rPr lang="en-US" sz="3000">
                 <a:solidFill>
                   <a:schemeClr val="dk1"/>
                 </a:solidFill>
@@ -11842,7 +12039,7 @@
               <a:t>Our front-end team, composed of </a:t>
             </a:r>
             <a:r>
-              <a:rPr i="1" lang="en-US" sz="2900">
+              <a:rPr i="1" lang="en-US" sz="3000">
                 <a:solidFill>
                   <a:schemeClr val="dk1"/>
                 </a:solidFill>
@@ -11854,7 +12051,7 @@
               <a:t>Abrar Zaki </a:t>
             </a:r>
             <a:r>
-              <a:rPr lang="en-US" sz="2900">
+              <a:rPr lang="en-US" sz="3000">
                 <a:solidFill>
                   <a:schemeClr val="dk1"/>
                 </a:solidFill>
@@ -11866,7 +12063,7 @@
               <a:t>and </a:t>
             </a:r>
             <a:r>
-              <a:rPr i="1" lang="en-US" sz="2900">
+              <a:rPr i="1" lang="en-US" sz="3000">
                 <a:solidFill>
                   <a:schemeClr val="dk1"/>
                 </a:solidFill>
@@ -11878,7 +12075,7 @@
               <a:t>Joshua Javillo</a:t>
             </a:r>
             <a:r>
-              <a:rPr lang="en-US" sz="2900">
+              <a:rPr lang="en-US" sz="3000">
                 <a:solidFill>
                   <a:schemeClr val="dk1"/>
                 </a:solidFill>
@@ -11889,7 +12086,7 @@
               </a:rPr>
               <a:t>, researched for ways to create a simple, easy-to-use UI. </a:t>
             </a:r>
-            <a:endParaRPr sz="2900">
+            <a:endParaRPr sz="3000">
               <a:solidFill>
                 <a:schemeClr val="dk1"/>
               </a:solidFill>
@@ -11900,7 +12097,7 @@
             </a:endParaRPr>
           </a:p>
           <a:p>
-            <a:pPr indent="-412750" lvl="0" marL="457200" rtl="0" algn="l">
+            <a:pPr indent="-419100" lvl="0" marL="457200" rtl="0" algn="l">
               <a:lnSpc>
                 <a:spcPct val="115000"/>
               </a:lnSpc>
@@ -11913,12 +12110,12 @@
               <a:buClr>
                 <a:schemeClr val="dk1"/>
               </a:buClr>
-              <a:buSzPts val="2900"/>
+              <a:buSzPts val="3000"/>
               <a:buFont typeface="Helvetica Neue"/>
               <a:buChar char="●"/>
             </a:pPr>
             <a:r>
-              <a:rPr lang="en-US" sz="2900">
+              <a:rPr lang="en-US" sz="3000">
                 <a:solidFill>
                   <a:schemeClr val="dk1"/>
                 </a:solidFill>
@@ -11930,7 +12127,7 @@
               <a:t>First we researched </a:t>
             </a:r>
             <a:r>
-              <a:rPr b="1" lang="en-US" sz="2900">
+              <a:rPr b="1" lang="en-US" sz="3000">
                 <a:solidFill>
                   <a:schemeClr val="dk1"/>
                 </a:solidFill>
@@ -11942,7 +12139,7 @@
               <a:t>Tkinter </a:t>
             </a:r>
             <a:r>
-              <a:rPr lang="en-US" sz="2900">
+              <a:rPr lang="en-US" sz="3000">
                 <a:solidFill>
                   <a:schemeClr val="dk1"/>
                 </a:solidFill>
@@ -11954,7 +12151,7 @@
               <a:t>as that is a popular way to make GUIs in python. However, the team found a library built upon </a:t>
             </a:r>
             <a:r>
-              <a:rPr b="1" lang="en-US" sz="2900">
+              <a:rPr b="1" lang="en-US" sz="3000">
                 <a:solidFill>
                   <a:schemeClr val="dk1"/>
                 </a:solidFill>
@@ -11966,7 +12163,7 @@
               <a:t>Tkinter</a:t>
             </a:r>
             <a:r>
-              <a:rPr lang="en-US" sz="2900">
+              <a:rPr lang="en-US" sz="3000">
                 <a:solidFill>
                   <a:schemeClr val="dk1"/>
                 </a:solidFill>
@@ -11978,7 +12175,7 @@
               <a:t>, called</a:t>
             </a:r>
             <a:r>
-              <a:rPr b="1" lang="en-US" sz="2900">
+              <a:rPr b="1" lang="en-US" sz="3000">
                 <a:solidFill>
                   <a:schemeClr val="dk1"/>
                 </a:solidFill>
@@ -11990,7 +12187,7 @@
               <a:t> </a:t>
             </a:r>
             <a:r>
-              <a:rPr b="1" lang="en-US" sz="2900">
+              <a:rPr b="1" lang="en-US" sz="3000">
                 <a:solidFill>
                   <a:schemeClr val="dk1"/>
                 </a:solidFill>
@@ -12002,7 +12199,7 @@
               <a:t>Custom Tkinter</a:t>
             </a:r>
             <a:r>
-              <a:rPr b="1" lang="en-US" sz="2900">
+              <a:rPr b="1" lang="en-US" sz="3000">
                 <a:solidFill>
                   <a:schemeClr val="dk1"/>
                 </a:solidFill>
@@ -12014,7 +12211,7 @@
               <a:t> </a:t>
             </a:r>
             <a:r>
-              <a:rPr lang="en-US" sz="2900">
+              <a:rPr lang="en-US" sz="3000">
                 <a:solidFill>
                   <a:schemeClr val="dk1"/>
                 </a:solidFill>
@@ -12025,7 +12222,7 @@
               </a:rPr>
               <a:t>that makes it easier to create UI components.</a:t>
             </a:r>
-            <a:endParaRPr sz="2900">
+            <a:endParaRPr sz="3000">
               <a:solidFill>
                 <a:schemeClr val="dk1"/>
               </a:solidFill>
@@ -12036,7 +12233,7 @@
             </a:endParaRPr>
           </a:p>
           <a:p>
-            <a:pPr indent="-412750" lvl="0" marL="457200" rtl="0" algn="l">
+            <a:pPr indent="-419100" lvl="0" marL="457200" rtl="0" algn="l">
               <a:lnSpc>
                 <a:spcPct val="115000"/>
               </a:lnSpc>
@@ -12049,12 +12246,12 @@
               <a:buClr>
                 <a:schemeClr val="dk1"/>
               </a:buClr>
-              <a:buSzPts val="2900"/>
+              <a:buSzPts val="3000"/>
               <a:buFont typeface="Helvetica Neue"/>
               <a:buChar char="●"/>
             </a:pPr>
             <a:r>
-              <a:rPr lang="en-US" sz="2900">
+              <a:rPr lang="en-US" sz="3000">
                 <a:solidFill>
                   <a:schemeClr val="dk1"/>
                 </a:solidFill>
@@ -12066,7 +12263,7 @@
               <a:t> Since we want to be able to run our application across all </a:t>
             </a:r>
             <a:r>
-              <a:rPr lang="en-US" sz="2900">
+              <a:rPr lang="en-US" sz="3000">
                 <a:solidFill>
                   <a:schemeClr val="dk1"/>
                 </a:solidFill>
@@ -12078,7 +12275,7 @@
               <a:t>platforms</a:t>
             </a:r>
             <a:r>
-              <a:rPr lang="en-US" sz="2900">
+              <a:rPr lang="en-US" sz="3000">
                 <a:solidFill>
                   <a:schemeClr val="dk1"/>
                 </a:solidFill>
@@ -12090,7 +12287,7 @@
               <a:t>(Windows, Mac, Linux), we decided on using </a:t>
             </a:r>
             <a:r>
-              <a:rPr b="1" lang="en-US" sz="2900">
+              <a:rPr b="1" lang="en-US" sz="3000">
                 <a:solidFill>
                   <a:schemeClr val="dk1"/>
                 </a:solidFill>
@@ -12102,7 +12299,7 @@
               <a:t>Docker </a:t>
             </a:r>
             <a:r>
-              <a:rPr lang="en-US" sz="2900">
+              <a:rPr lang="en-US" sz="3000">
                 <a:solidFill>
                   <a:schemeClr val="dk1"/>
                 </a:solidFill>
@@ -12114,7 +12311,7 @@
               <a:t>to</a:t>
             </a:r>
             <a:r>
-              <a:rPr lang="en-US" sz="2900">
+              <a:rPr lang="en-US" sz="3000">
                 <a:solidFill>
                   <a:schemeClr val="dk1"/>
                 </a:solidFill>
@@ -12125,7 +12322,7 @@
               </a:rPr>
               <a:t> distribute S.I.F.T.</a:t>
             </a:r>
-            <a:endParaRPr sz="2900">
+            <a:endParaRPr sz="3000">
               <a:latin typeface="Helvetica Neue"/>
               <a:ea typeface="Helvetica Neue"/>
               <a:cs typeface="Helvetica Neue"/>
@@ -12150,8 +12347,8 @@
         </p:blipFill>
         <p:spPr>
           <a:xfrm>
-            <a:off x="618737" y="17588525"/>
-            <a:ext cx="4838650" cy="3817989"/>
+            <a:off x="12366275" y="17490975"/>
+            <a:ext cx="6487552" cy="5119074"/>
           </a:xfrm>
           <a:prstGeom prst="rect">
             <a:avLst/>
@@ -12178,8 +12375,8 @@
         </p:blipFill>
         <p:spPr>
           <a:xfrm>
-            <a:off x="5547062" y="17584100"/>
-            <a:ext cx="4838650" cy="3818005"/>
+            <a:off x="19020451" y="22829700"/>
+            <a:ext cx="6487549" cy="5119147"/>
           </a:xfrm>
           <a:prstGeom prst="rect">
             <a:avLst/>
@@ -12206,8 +12403,8 @@
         </p:blipFill>
         <p:spPr>
           <a:xfrm>
-            <a:off x="618738" y="21506363"/>
-            <a:ext cx="4838650" cy="3817977"/>
+            <a:off x="19020450" y="17509900"/>
+            <a:ext cx="6487549" cy="5119046"/>
           </a:xfrm>
           <a:prstGeom prst="rect">
             <a:avLst/>
@@ -12233,8 +12430,8 @@
         </p:blipFill>
         <p:spPr>
           <a:xfrm>
-            <a:off x="5547063" y="21506363"/>
-            <a:ext cx="4838650" cy="3817999"/>
+            <a:off x="12366275" y="22847500"/>
+            <a:ext cx="6487549" cy="5119049"/>
           </a:xfrm>
           <a:prstGeom prst="rect">
             <a:avLst/>
@@ -12261,8 +12458,8 @@
         </p:blipFill>
         <p:spPr>
           <a:xfrm>
-            <a:off x="618738" y="25424200"/>
-            <a:ext cx="4838651" cy="2735872"/>
+            <a:off x="12366276" y="28204000"/>
+            <a:ext cx="6487550" cy="3668193"/>
           </a:xfrm>
           <a:prstGeom prst="rect">
             <a:avLst/>
@@ -12289,8 +12486,8 @@
         </p:blipFill>
         <p:spPr>
           <a:xfrm>
-            <a:off x="5547062" y="27988600"/>
-            <a:ext cx="4838650" cy="3817979"/>
+            <a:off x="25674632" y="22829727"/>
+            <a:ext cx="6487549" cy="5119087"/>
           </a:xfrm>
           <a:prstGeom prst="rect">
             <a:avLst/>
@@ -12317,8 +12514,8 @@
         </p:blipFill>
         <p:spPr>
           <a:xfrm>
-            <a:off x="5547050" y="25419633"/>
-            <a:ext cx="4838649" cy="2473691"/>
+            <a:off x="19096651" y="28149600"/>
+            <a:ext cx="6487552" cy="3316682"/>
           </a:xfrm>
           <a:prstGeom prst="rect">
             <a:avLst/>
@@ -12345,8 +12542,8 @@
         </p:blipFill>
         <p:spPr>
           <a:xfrm>
-            <a:off x="618736" y="28259925"/>
-            <a:ext cx="4838649" cy="2381038"/>
+            <a:off x="25750825" y="28211702"/>
+            <a:ext cx="6487550" cy="3192454"/>
           </a:xfrm>
           <a:prstGeom prst="rect">
             <a:avLst/>
@@ -12401,7 +12598,7 @@
         </p:blipFill>
         <p:spPr>
           <a:xfrm flipH="1">
-            <a:off x="11460151" y="7592848"/>
+            <a:off x="11460151" y="7864135"/>
             <a:ext cx="624824" cy="624824"/>
           </a:xfrm>
           <a:prstGeom prst="rect">
@@ -12429,7 +12626,7 @@
         </p:blipFill>
         <p:spPr>
           <a:xfrm flipH="1">
-            <a:off x="11460151" y="8141473"/>
+            <a:off x="11460151" y="8651048"/>
             <a:ext cx="624824" cy="624824"/>
           </a:xfrm>
           <a:prstGeom prst="rect">
@@ -12457,7 +12654,7 @@
         </p:blipFill>
         <p:spPr>
           <a:xfrm flipH="1">
-            <a:off x="11460151" y="9117423"/>
+            <a:off x="11460151" y="9984973"/>
             <a:ext cx="624824" cy="624824"/>
           </a:xfrm>
           <a:prstGeom prst="rect">
@@ -12485,7 +12682,7 @@
         </p:blipFill>
         <p:spPr>
           <a:xfrm flipH="1">
-            <a:off x="11460151" y="9616398"/>
+            <a:off x="11460151" y="10605473"/>
             <a:ext cx="624824" cy="624824"/>
           </a:xfrm>
           <a:prstGeom prst="rect">
@@ -12513,7 +12710,7 @@
         </p:blipFill>
         <p:spPr>
           <a:xfrm flipH="1">
-            <a:off x="11460151" y="10093373"/>
+            <a:off x="11460151" y="11318898"/>
             <a:ext cx="624824" cy="624824"/>
           </a:xfrm>
           <a:prstGeom prst="rect">
@@ -12541,7 +12738,7 @@
         </p:blipFill>
         <p:spPr>
           <a:xfrm flipH="1">
-            <a:off x="33405905" y="21854525"/>
+            <a:off x="33405905" y="20940125"/>
             <a:ext cx="624824" cy="624824"/>
           </a:xfrm>
           <a:prstGeom prst="rect">
@@ -12625,7 +12822,7 @@
         </p:blipFill>
         <p:spPr>
           <a:xfrm flipH="1">
-            <a:off x="33405905" y="23102950"/>
+            <a:off x="33405905" y="22264750"/>
             <a:ext cx="624824" cy="624824"/>
           </a:xfrm>
           <a:prstGeom prst="rect">
@@ -12653,7 +12850,7 @@
         </p:blipFill>
         <p:spPr>
           <a:xfrm flipH="1">
-            <a:off x="33405905" y="24351375"/>
+            <a:off x="33405905" y="23665575"/>
             <a:ext cx="624824" cy="624824"/>
           </a:xfrm>
           <a:prstGeom prst="rect">
@@ -12681,7 +12878,7 @@
         </p:blipFill>
         <p:spPr>
           <a:xfrm flipH="1">
-            <a:off x="33405905" y="25169225"/>
+            <a:off x="33405905" y="24559625"/>
             <a:ext cx="624824" cy="624824"/>
           </a:xfrm>
           <a:prstGeom prst="rect">
@@ -12709,7 +12906,7 @@
         </p:blipFill>
         <p:spPr>
           <a:xfrm flipH="1">
-            <a:off x="33405905" y="26046650"/>
+            <a:off x="33405905" y="25437050"/>
             <a:ext cx="624824" cy="624824"/>
           </a:xfrm>
           <a:prstGeom prst="rect">
@@ -12737,7 +12934,7 @@
         </p:blipFill>
         <p:spPr>
           <a:xfrm flipH="1">
-            <a:off x="33405905" y="28483925"/>
+            <a:off x="33482105" y="29169725"/>
             <a:ext cx="624824" cy="624824"/>
           </a:xfrm>
           <a:prstGeom prst="rect">
@@ -12765,7 +12962,7 @@
         </p:blipFill>
         <p:spPr>
           <a:xfrm flipH="1">
-            <a:off x="33405905" y="28908175"/>
+            <a:off x="33482105" y="29670175"/>
             <a:ext cx="624824" cy="624824"/>
           </a:xfrm>
           <a:prstGeom prst="rect">
@@ -12793,7 +12990,7 @@
         </p:blipFill>
         <p:spPr>
           <a:xfrm flipH="1">
-            <a:off x="33405905" y="29374525"/>
+            <a:off x="33482105" y="30136525"/>
             <a:ext cx="624824" cy="624824"/>
           </a:xfrm>
           <a:prstGeom prst="rect">
@@ -12849,7 +13046,7 @@
         </p:blipFill>
         <p:spPr>
           <a:xfrm flipH="1">
-            <a:off x="33844364" y="9904450"/>
+            <a:off x="33844364" y="9980650"/>
             <a:ext cx="624824" cy="624824"/>
           </a:xfrm>
           <a:prstGeom prst="rect">
@@ -12877,7 +13074,7 @@
         </p:blipFill>
         <p:spPr>
           <a:xfrm flipH="1">
-            <a:off x="33844376" y="10854481"/>
+            <a:off x="33844376" y="11083081"/>
             <a:ext cx="624824" cy="624824"/>
           </a:xfrm>
           <a:prstGeom prst="rect">
@@ -12905,7 +13102,7 @@
         </p:blipFill>
         <p:spPr>
           <a:xfrm flipH="1">
-            <a:off x="22163539" y="9059696"/>
+            <a:off x="22163539" y="9135896"/>
             <a:ext cx="624824" cy="624824"/>
           </a:xfrm>
           <a:prstGeom prst="rect">
@@ -12933,7 +13130,7 @@
         </p:blipFill>
         <p:spPr>
           <a:xfrm flipH="1">
-            <a:off x="22163539" y="11069759"/>
+            <a:off x="22087339" y="11298359"/>
             <a:ext cx="624824" cy="624824"/>
           </a:xfrm>
           <a:prstGeom prst="rect">
@@ -12961,7 +13158,7 @@
         </p:blipFill>
         <p:spPr>
           <a:xfrm flipH="1">
-            <a:off x="33434764" y="12368450"/>
+            <a:off x="33434764" y="12673250"/>
             <a:ext cx="624824" cy="624824"/>
           </a:xfrm>
           <a:prstGeom prst="rect">
@@ -12989,7 +13186,7 @@
         </p:blipFill>
         <p:spPr>
           <a:xfrm flipH="1">
-            <a:off x="33405901" y="13827831"/>
+            <a:off x="33405901" y="14208831"/>
             <a:ext cx="624824" cy="624824"/>
           </a:xfrm>
           <a:prstGeom prst="rect">
@@ -13017,7 +13214,7 @@
         </p:blipFill>
         <p:spPr>
           <a:xfrm flipH="1">
-            <a:off x="22163539" y="12612232"/>
+            <a:off x="22055589" y="12917032"/>
             <a:ext cx="624824" cy="624824"/>
           </a:xfrm>
           <a:prstGeom prst="rect">
@@ -13045,7 +13242,7 @@
         </p:blipFill>
         <p:spPr>
           <a:xfrm flipH="1">
-            <a:off x="33844376" y="14438206"/>
+            <a:off x="33920576" y="14743006"/>
             <a:ext cx="624824" cy="624824"/>
           </a:xfrm>
           <a:prstGeom prst="rect">
@@ -13073,7 +13270,7 @@
         </p:blipFill>
         <p:spPr>
           <a:xfrm flipH="1">
-            <a:off x="33844376" y="15759218"/>
+            <a:off x="33844376" y="16286831"/>
             <a:ext cx="624824" cy="624824"/>
           </a:xfrm>
           <a:prstGeom prst="rect">
@@ -13101,7 +13298,7 @@
         </p:blipFill>
         <p:spPr>
           <a:xfrm flipH="1">
-            <a:off x="33844376" y="16743556"/>
+            <a:off x="33844376" y="17462368"/>
             <a:ext cx="624824" cy="624824"/>
           </a:xfrm>
           <a:prstGeom prst="rect">
@@ -13129,7 +13326,7 @@
         </p:blipFill>
         <p:spPr>
           <a:xfrm flipH="1">
-            <a:off x="22163539" y="13784096"/>
+            <a:off x="22087339" y="13860296"/>
             <a:ext cx="624824" cy="624824"/>
           </a:xfrm>
           <a:prstGeom prst="rect">
@@ -13157,7 +13354,986 @@
         </p:blipFill>
         <p:spPr>
           <a:xfrm flipH="1">
-            <a:off x="22163539" y="14640768"/>
+            <a:off x="22087339" y="14945568"/>
+            <a:ext cx="624824" cy="624824"/>
+          </a:xfrm>
+          <a:prstGeom prst="rect">
+            <a:avLst/>
+          </a:prstGeom>
+          <a:noFill/>
+          <a:ln>
+            <a:noFill/>
+          </a:ln>
+        </p:spPr>
+      </p:pic>
+      <p:sp>
+        <p:nvSpPr>
+          <p:cNvPr id="101" name="Google Shape;101;p1"/>
+          <p:cNvSpPr txBox="1"/>
+          <p:nvPr>
+            <p:ph idx="3" type="body"/>
+          </p:nvPr>
+        </p:nvSpPr>
+        <p:spPr>
+          <a:xfrm>
+            <a:off x="472638" y="18267538"/>
+            <a:ext cx="10050600" cy="877200"/>
+          </a:xfrm>
+          <a:prstGeom prst="rect">
+            <a:avLst/>
+          </a:prstGeom>
+          <a:noFill/>
+          <a:ln>
+            <a:noFill/>
+          </a:ln>
+        </p:spPr>
+        <p:txBody>
+          <a:bodyPr anchorCtr="0" anchor="ctr" bIns="91425" lIns="91425" spcFirstLastPara="1" rIns="91425" wrap="square" tIns="91425">
+            <a:spAutoFit/>
+          </a:bodyPr>
+          <a:lstStyle/>
+          <a:p>
+            <a:pPr indent="0" lvl="0" marL="0" rtl="0" algn="ctr">
+              <a:spcBef>
+                <a:spcPts val="0"/>
+              </a:spcBef>
+              <a:spcAft>
+                <a:spcPts val="0"/>
+              </a:spcAft>
+              <a:buClr>
+                <a:srgbClr val="1F3864"/>
+              </a:buClr>
+              <a:buSzPts val="3700"/>
+              <a:buNone/>
+            </a:pPr>
+            <a:r>
+              <a:rPr lang="en-US" sz="4500">
+                <a:latin typeface="Helvetica Neue"/>
+                <a:ea typeface="Helvetica Neue"/>
+                <a:cs typeface="Helvetica Neue"/>
+                <a:sym typeface="Helvetica Neue"/>
+              </a:rPr>
+              <a:t>Accomplishments</a:t>
+            </a:r>
+            <a:endParaRPr sz="4500">
+              <a:latin typeface="Helvetica Neue"/>
+              <a:ea typeface="Helvetica Neue"/>
+              <a:cs typeface="Helvetica Neue"/>
+              <a:sym typeface="Helvetica Neue"/>
+            </a:endParaRPr>
+          </a:p>
+        </p:txBody>
+      </p:sp>
+      <p:pic>
+        <p:nvPicPr>
+          <p:cNvPr id="102" name="Google Shape;102;p1"/>
+          <p:cNvPicPr preferRelativeResize="0"/>
+          <p:nvPr/>
+        </p:nvPicPr>
+        <p:blipFill>
+          <a:blip r:embed="rId4">
+            <a:alphaModFix amt="77000"/>
+          </a:blip>
+          <a:stretch>
+            <a:fillRect/>
+          </a:stretch>
+        </p:blipFill>
+        <p:spPr>
+          <a:xfrm>
+            <a:off x="477825" y="19133125"/>
+            <a:ext cx="10464500" cy="12739075"/>
+          </a:xfrm>
+          <a:prstGeom prst="rect">
+            <a:avLst/>
+          </a:prstGeom>
+          <a:noFill/>
+          <a:ln>
+            <a:noFill/>
+          </a:ln>
+        </p:spPr>
+      </p:pic>
+      <p:pic>
+        <p:nvPicPr>
+          <p:cNvPr id="103" name="Google Shape;103;p1"/>
+          <p:cNvPicPr preferRelativeResize="0"/>
+          <p:nvPr/>
+        </p:nvPicPr>
+        <p:blipFill rotWithShape="1">
+          <a:blip r:embed="rId19">
+            <a:alphaModFix/>
+          </a:blip>
+          <a:srcRect b="1989" l="0" r="0" t="0"/>
+          <a:stretch/>
+        </p:blipFill>
+        <p:spPr>
+          <a:xfrm>
+            <a:off x="25674625" y="17479825"/>
+            <a:ext cx="6487550" cy="5119050"/>
+          </a:xfrm>
+          <a:prstGeom prst="rect">
+            <a:avLst/>
+          </a:prstGeom>
+          <a:noFill/>
+          <a:ln>
+            <a:noFill/>
+          </a:ln>
+        </p:spPr>
+      </p:pic>
+      <p:pic>
+        <p:nvPicPr>
+          <p:cNvPr id="104" name="Google Shape;104;p1"/>
+          <p:cNvPicPr preferRelativeResize="0"/>
+          <p:nvPr/>
+        </p:nvPicPr>
+        <p:blipFill>
+          <a:blip r:embed="rId3">
+            <a:alphaModFix/>
+          </a:blip>
+          <a:stretch>
+            <a:fillRect/>
+          </a:stretch>
+        </p:blipFill>
+        <p:spPr>
+          <a:xfrm flipH="1">
+            <a:off x="477826" y="6610848"/>
+            <a:ext cx="624824" cy="624824"/>
+          </a:xfrm>
+          <a:prstGeom prst="rect">
+            <a:avLst/>
+          </a:prstGeom>
+          <a:noFill/>
+          <a:ln>
+            <a:noFill/>
+          </a:ln>
+        </p:spPr>
+      </p:pic>
+      <p:pic>
+        <p:nvPicPr>
+          <p:cNvPr id="105" name="Google Shape;105;p1"/>
+          <p:cNvPicPr preferRelativeResize="0"/>
+          <p:nvPr/>
+        </p:nvPicPr>
+        <p:blipFill>
+          <a:blip r:embed="rId3">
+            <a:alphaModFix/>
+          </a:blip>
+          <a:stretch>
+            <a:fillRect/>
+          </a:stretch>
+        </p:blipFill>
+        <p:spPr>
+          <a:xfrm flipH="1">
+            <a:off x="477826" y="8728110"/>
+            <a:ext cx="624824" cy="624824"/>
+          </a:xfrm>
+          <a:prstGeom prst="rect">
+            <a:avLst/>
+          </a:prstGeom>
+          <a:noFill/>
+          <a:ln>
+            <a:noFill/>
+          </a:ln>
+        </p:spPr>
+      </p:pic>
+      <p:pic>
+        <p:nvPicPr>
+          <p:cNvPr id="106" name="Google Shape;106;p1"/>
+          <p:cNvPicPr preferRelativeResize="0"/>
+          <p:nvPr/>
+        </p:nvPicPr>
+        <p:blipFill>
+          <a:blip r:embed="rId3">
+            <a:alphaModFix/>
+          </a:blip>
+          <a:stretch>
+            <a:fillRect/>
+          </a:stretch>
+        </p:blipFill>
+        <p:spPr>
+          <a:xfrm flipH="1">
+            <a:off x="477826" y="11318910"/>
+            <a:ext cx="624824" cy="624824"/>
+          </a:xfrm>
+          <a:prstGeom prst="rect">
+            <a:avLst/>
+          </a:prstGeom>
+          <a:noFill/>
+          <a:ln>
+            <a:noFill/>
+          </a:ln>
+        </p:spPr>
+      </p:pic>
+      <p:pic>
+        <p:nvPicPr>
+          <p:cNvPr id="107" name="Google Shape;107;p1"/>
+          <p:cNvPicPr preferRelativeResize="0"/>
+          <p:nvPr/>
+        </p:nvPicPr>
+        <p:blipFill>
+          <a:blip r:embed="rId3">
+            <a:alphaModFix/>
+          </a:blip>
+          <a:stretch>
+            <a:fillRect/>
+          </a:stretch>
+        </p:blipFill>
+        <p:spPr>
+          <a:xfrm flipH="1">
+            <a:off x="477826" y="16119510"/>
+            <a:ext cx="624824" cy="624824"/>
+          </a:xfrm>
+          <a:prstGeom prst="rect">
+            <a:avLst/>
+          </a:prstGeom>
+          <a:noFill/>
+          <a:ln>
+            <a:noFill/>
+          </a:ln>
+        </p:spPr>
+      </p:pic>
+      <p:pic>
+        <p:nvPicPr>
+          <p:cNvPr id="108" name="Google Shape;108;p1"/>
+          <p:cNvPicPr preferRelativeResize="0"/>
+          <p:nvPr/>
+        </p:nvPicPr>
+        <p:blipFill>
+          <a:blip r:embed="rId3">
+            <a:alphaModFix/>
+          </a:blip>
+          <a:stretch>
+            <a:fillRect/>
+          </a:stretch>
+        </p:blipFill>
+        <p:spPr>
+          <a:xfrm flipH="1">
+            <a:off x="935026" y="12385710"/>
+            <a:ext cx="624824" cy="624824"/>
+          </a:xfrm>
+          <a:prstGeom prst="rect">
+            <a:avLst/>
+          </a:prstGeom>
+          <a:noFill/>
+          <a:ln>
+            <a:noFill/>
+          </a:ln>
+        </p:spPr>
+      </p:pic>
+      <p:pic>
+        <p:nvPicPr>
+          <p:cNvPr id="109" name="Google Shape;109;p1"/>
+          <p:cNvPicPr preferRelativeResize="0"/>
+          <p:nvPr/>
+        </p:nvPicPr>
+        <p:blipFill>
+          <a:blip r:embed="rId3">
+            <a:alphaModFix/>
+          </a:blip>
+          <a:stretch>
+            <a:fillRect/>
+          </a:stretch>
+        </p:blipFill>
+        <p:spPr>
+          <a:xfrm flipH="1">
+            <a:off x="935026" y="13985910"/>
+            <a:ext cx="624824" cy="624824"/>
+          </a:xfrm>
+          <a:prstGeom prst="rect">
+            <a:avLst/>
+          </a:prstGeom>
+          <a:noFill/>
+          <a:ln>
+            <a:noFill/>
+          </a:ln>
+        </p:spPr>
+      </p:pic>
+      <p:sp>
+        <p:nvSpPr>
+          <p:cNvPr id="110" name="Google Shape;110;p1"/>
+          <p:cNvSpPr txBox="1"/>
+          <p:nvPr/>
+        </p:nvSpPr>
+        <p:spPr>
+          <a:xfrm>
+            <a:off x="428325" y="19347175"/>
+            <a:ext cx="10464600" cy="12525000"/>
+          </a:xfrm>
+          <a:prstGeom prst="rect">
+            <a:avLst/>
+          </a:prstGeom>
+          <a:noFill/>
+          <a:ln>
+            <a:noFill/>
+          </a:ln>
+        </p:spPr>
+        <p:txBody>
+          <a:bodyPr anchorCtr="0" anchor="t" bIns="91425" lIns="91425" spcFirstLastPara="1" rIns="91425" wrap="square" tIns="91425">
+            <a:noAutofit/>
+          </a:bodyPr>
+          <a:lstStyle/>
+          <a:p>
+            <a:pPr indent="-419100" lvl="0" marL="914400" rtl="0" algn="l">
+              <a:lnSpc>
+                <a:spcPct val="115000"/>
+              </a:lnSpc>
+              <a:spcBef>
+                <a:spcPts val="0"/>
+              </a:spcBef>
+              <a:spcAft>
+                <a:spcPts val="0"/>
+              </a:spcAft>
+              <a:buClr>
+                <a:schemeClr val="dk1"/>
+              </a:buClr>
+              <a:buSzPts val="3000"/>
+              <a:buFont typeface="Helvetica Neue"/>
+              <a:buChar char="●"/>
+            </a:pPr>
+            <a:r>
+              <a:rPr lang="en-US" sz="3000">
+                <a:solidFill>
+                  <a:schemeClr val="dk1"/>
+                </a:solidFill>
+                <a:latin typeface="Helvetica Neue"/>
+                <a:ea typeface="Helvetica Neue"/>
+                <a:cs typeface="Helvetica Neue"/>
+                <a:sym typeface="Helvetica Neue"/>
+              </a:rPr>
+              <a:t>We started S.I.F.T from scratch, making our UI over the semester</a:t>
+            </a:r>
+            <a:endParaRPr sz="3000">
+              <a:solidFill>
+                <a:schemeClr val="dk1"/>
+              </a:solidFill>
+              <a:latin typeface="Helvetica Neue"/>
+              <a:ea typeface="Helvetica Neue"/>
+              <a:cs typeface="Helvetica Neue"/>
+              <a:sym typeface="Helvetica Neue"/>
+            </a:endParaRPr>
+          </a:p>
+          <a:p>
+            <a:pPr indent="-419100" lvl="1" marL="1371600" rtl="0" algn="l">
+              <a:lnSpc>
+                <a:spcPct val="115000"/>
+              </a:lnSpc>
+              <a:spcBef>
+                <a:spcPts val="0"/>
+              </a:spcBef>
+              <a:spcAft>
+                <a:spcPts val="0"/>
+              </a:spcAft>
+              <a:buClr>
+                <a:schemeClr val="dk1"/>
+              </a:buClr>
+              <a:buSzPts val="3000"/>
+              <a:buFont typeface="Helvetica Neue"/>
+              <a:buChar char="○"/>
+            </a:pPr>
+            <a:r>
+              <a:rPr lang="en-US" sz="3000">
+                <a:solidFill>
+                  <a:schemeClr val="dk1"/>
+                </a:solidFill>
+                <a:latin typeface="Helvetica Neue"/>
+                <a:ea typeface="Helvetica Neue"/>
+                <a:cs typeface="Helvetica Neue"/>
+                <a:sym typeface="Helvetica Neue"/>
+              </a:rPr>
+              <a:t>We also implements different color option for our UI</a:t>
+            </a:r>
+            <a:endParaRPr sz="3000">
+              <a:solidFill>
+                <a:schemeClr val="dk1"/>
+              </a:solidFill>
+              <a:latin typeface="Helvetica Neue"/>
+              <a:ea typeface="Helvetica Neue"/>
+              <a:cs typeface="Helvetica Neue"/>
+              <a:sym typeface="Helvetica Neue"/>
+            </a:endParaRPr>
+          </a:p>
+          <a:p>
+            <a:pPr indent="-419100" lvl="0" marL="914400" rtl="0" algn="l">
+              <a:lnSpc>
+                <a:spcPct val="115000"/>
+              </a:lnSpc>
+              <a:spcBef>
+                <a:spcPts val="0"/>
+              </a:spcBef>
+              <a:spcAft>
+                <a:spcPts val="0"/>
+              </a:spcAft>
+              <a:buClr>
+                <a:schemeClr val="dk1"/>
+              </a:buClr>
+              <a:buSzPts val="3000"/>
+              <a:buFont typeface="Helvetica Neue"/>
+              <a:buChar char="●"/>
+            </a:pPr>
+            <a:r>
+              <a:rPr lang="en-US" sz="3000">
+                <a:solidFill>
+                  <a:schemeClr val="dk1"/>
+                </a:solidFill>
+                <a:latin typeface="Helvetica Neue"/>
+                <a:ea typeface="Helvetica Neue"/>
+                <a:cs typeface="Helvetica Neue"/>
+                <a:sym typeface="Helvetica Neue"/>
+              </a:rPr>
+              <a:t>In our front end, the user can select what files we they want to run, through their native OS’ file system</a:t>
+            </a:r>
+            <a:endParaRPr sz="3000">
+              <a:solidFill>
+                <a:schemeClr val="dk1"/>
+              </a:solidFill>
+              <a:latin typeface="Helvetica Neue"/>
+              <a:ea typeface="Helvetica Neue"/>
+              <a:cs typeface="Helvetica Neue"/>
+              <a:sym typeface="Helvetica Neue"/>
+            </a:endParaRPr>
+          </a:p>
+          <a:p>
+            <a:pPr indent="-419100" lvl="0" marL="914400" rtl="0" algn="l">
+              <a:lnSpc>
+                <a:spcPct val="115000"/>
+              </a:lnSpc>
+              <a:spcBef>
+                <a:spcPts val="0"/>
+              </a:spcBef>
+              <a:spcAft>
+                <a:spcPts val="0"/>
+              </a:spcAft>
+              <a:buClr>
+                <a:schemeClr val="dk1"/>
+              </a:buClr>
+              <a:buSzPts val="3000"/>
+              <a:buFont typeface="Helvetica Neue"/>
+              <a:buChar char="●"/>
+            </a:pPr>
+            <a:r>
+              <a:rPr lang="en-US" sz="3000">
+                <a:solidFill>
+                  <a:schemeClr val="dk1"/>
+                </a:solidFill>
+                <a:latin typeface="Helvetica Neue"/>
+                <a:ea typeface="Helvetica Neue"/>
+                <a:cs typeface="Helvetica Neue"/>
+                <a:sym typeface="Helvetica Neue"/>
+              </a:rPr>
+              <a:t>We created a functionable user interface using CustomTkinter, a UI library build on top Tkinter for python</a:t>
+            </a:r>
+            <a:endParaRPr sz="3000">
+              <a:solidFill>
+                <a:schemeClr val="dk1"/>
+              </a:solidFill>
+              <a:latin typeface="Helvetica Neue"/>
+              <a:ea typeface="Helvetica Neue"/>
+              <a:cs typeface="Helvetica Neue"/>
+              <a:sym typeface="Helvetica Neue"/>
+            </a:endParaRPr>
+          </a:p>
+          <a:p>
+            <a:pPr indent="-419100" lvl="0" marL="914400" rtl="0" algn="l">
+              <a:lnSpc>
+                <a:spcPct val="115000"/>
+              </a:lnSpc>
+              <a:spcBef>
+                <a:spcPts val="0"/>
+              </a:spcBef>
+              <a:spcAft>
+                <a:spcPts val="0"/>
+              </a:spcAft>
+              <a:buClr>
+                <a:schemeClr val="dk1"/>
+              </a:buClr>
+              <a:buSzPts val="3000"/>
+              <a:buFont typeface="Helvetica Neue"/>
+              <a:buChar char="●"/>
+            </a:pPr>
+            <a:r>
+              <a:rPr lang="en-US" sz="3000">
+                <a:solidFill>
+                  <a:schemeClr val="dk1"/>
+                </a:solidFill>
+                <a:latin typeface="Helvetica Neue"/>
+                <a:ea typeface="Helvetica Neue"/>
+                <a:cs typeface="Helvetica Neue"/>
+                <a:sym typeface="Helvetica Neue"/>
+              </a:rPr>
+              <a:t>We created a backend that runs programs in C++, other python programs, and java</a:t>
+            </a:r>
+            <a:endParaRPr sz="3000">
+              <a:solidFill>
+                <a:schemeClr val="dk1"/>
+              </a:solidFill>
+              <a:latin typeface="Helvetica Neue"/>
+              <a:ea typeface="Helvetica Neue"/>
+              <a:cs typeface="Helvetica Neue"/>
+              <a:sym typeface="Helvetica Neue"/>
+            </a:endParaRPr>
+          </a:p>
+          <a:p>
+            <a:pPr indent="-419100" lvl="1" marL="1371600" rtl="0" algn="l">
+              <a:lnSpc>
+                <a:spcPct val="115000"/>
+              </a:lnSpc>
+              <a:spcBef>
+                <a:spcPts val="0"/>
+              </a:spcBef>
+              <a:spcAft>
+                <a:spcPts val="0"/>
+              </a:spcAft>
+              <a:buClr>
+                <a:schemeClr val="dk1"/>
+              </a:buClr>
+              <a:buSzPts val="3000"/>
+              <a:buFont typeface="Helvetica Neue"/>
+              <a:buChar char="○"/>
+            </a:pPr>
+            <a:r>
+              <a:rPr lang="en-US" sz="3000">
+                <a:solidFill>
+                  <a:schemeClr val="dk1"/>
+                </a:solidFill>
+                <a:latin typeface="Helvetica Neue"/>
+                <a:ea typeface="Helvetica Neue"/>
+                <a:cs typeface="Helvetica Neue"/>
+                <a:sym typeface="Helvetica Neue"/>
+              </a:rPr>
+              <a:t>This is done through the python subprocess system</a:t>
+            </a:r>
+            <a:endParaRPr sz="3000">
+              <a:solidFill>
+                <a:schemeClr val="dk1"/>
+              </a:solidFill>
+              <a:latin typeface="Helvetica Neue"/>
+              <a:ea typeface="Helvetica Neue"/>
+              <a:cs typeface="Helvetica Neue"/>
+              <a:sym typeface="Helvetica Neue"/>
+            </a:endParaRPr>
+          </a:p>
+          <a:p>
+            <a:pPr indent="-419100" lvl="0" marL="914400" rtl="0" algn="l">
+              <a:lnSpc>
+                <a:spcPct val="115000"/>
+              </a:lnSpc>
+              <a:spcBef>
+                <a:spcPts val="0"/>
+              </a:spcBef>
+              <a:spcAft>
+                <a:spcPts val="0"/>
+              </a:spcAft>
+              <a:buClr>
+                <a:schemeClr val="dk1"/>
+              </a:buClr>
+              <a:buSzPts val="3000"/>
+              <a:buFont typeface="Helvetica Neue"/>
+              <a:buChar char="●"/>
+            </a:pPr>
+            <a:r>
+              <a:rPr lang="en-US" sz="3000">
+                <a:solidFill>
+                  <a:schemeClr val="dk1"/>
+                </a:solidFill>
+                <a:latin typeface="Helvetica Neue"/>
+                <a:ea typeface="Helvetica Neue"/>
+                <a:cs typeface="Helvetica Neue"/>
+                <a:sym typeface="Helvetica Neue"/>
+              </a:rPr>
+              <a:t>The way we construct paths for our files is OS agnostic, meaning our paths should work on any Operating System</a:t>
+            </a:r>
+            <a:endParaRPr sz="3000">
+              <a:solidFill>
+                <a:schemeClr val="dk1"/>
+              </a:solidFill>
+              <a:latin typeface="Helvetica Neue"/>
+              <a:ea typeface="Helvetica Neue"/>
+              <a:cs typeface="Helvetica Neue"/>
+              <a:sym typeface="Helvetica Neue"/>
+            </a:endParaRPr>
+          </a:p>
+          <a:p>
+            <a:pPr indent="-419100" lvl="0" marL="914400" rtl="0" algn="l">
+              <a:lnSpc>
+                <a:spcPct val="115000"/>
+              </a:lnSpc>
+              <a:spcBef>
+                <a:spcPts val="0"/>
+              </a:spcBef>
+              <a:spcAft>
+                <a:spcPts val="0"/>
+              </a:spcAft>
+              <a:buClr>
+                <a:schemeClr val="dk1"/>
+              </a:buClr>
+              <a:buSzPts val="3000"/>
+              <a:buFont typeface="Helvetica Neue"/>
+              <a:buChar char="●"/>
+            </a:pPr>
+            <a:r>
+              <a:rPr lang="en-US" sz="3000">
+                <a:solidFill>
+                  <a:schemeClr val="dk1"/>
+                </a:solidFill>
+                <a:latin typeface="Helvetica Neue"/>
+                <a:ea typeface="Helvetica Neue"/>
+                <a:cs typeface="Helvetica Neue"/>
+                <a:sym typeface="Helvetica Neue"/>
+              </a:rPr>
+              <a:t>We joined our backend with our frontend</a:t>
+            </a:r>
+            <a:endParaRPr sz="3000">
+              <a:solidFill>
+                <a:schemeClr val="dk1"/>
+              </a:solidFill>
+              <a:latin typeface="Helvetica Neue"/>
+              <a:ea typeface="Helvetica Neue"/>
+              <a:cs typeface="Helvetica Neue"/>
+              <a:sym typeface="Helvetica Neue"/>
+            </a:endParaRPr>
+          </a:p>
+          <a:p>
+            <a:pPr indent="-419100" lvl="1" marL="1371600" rtl="0" algn="l">
+              <a:lnSpc>
+                <a:spcPct val="115000"/>
+              </a:lnSpc>
+              <a:spcBef>
+                <a:spcPts val="0"/>
+              </a:spcBef>
+              <a:spcAft>
+                <a:spcPts val="0"/>
+              </a:spcAft>
+              <a:buClr>
+                <a:schemeClr val="dk1"/>
+              </a:buClr>
+              <a:buSzPts val="3000"/>
+              <a:buFont typeface="Helvetica Neue"/>
+              <a:buChar char="○"/>
+            </a:pPr>
+            <a:r>
+              <a:rPr lang="en-US" sz="3000">
+                <a:solidFill>
+                  <a:schemeClr val="dk1"/>
+                </a:solidFill>
+                <a:latin typeface="Helvetica Neue"/>
+                <a:ea typeface="Helvetica Neue"/>
+                <a:cs typeface="Helvetica Neue"/>
+                <a:sym typeface="Helvetica Neue"/>
+              </a:rPr>
+              <a:t>At the moment the programs we run through our print their output to the console</a:t>
+            </a:r>
+            <a:endParaRPr sz="3000">
+              <a:solidFill>
+                <a:schemeClr val="dk1"/>
+              </a:solidFill>
+              <a:latin typeface="Helvetica Neue"/>
+              <a:ea typeface="Helvetica Neue"/>
+              <a:cs typeface="Helvetica Neue"/>
+              <a:sym typeface="Helvetica Neue"/>
+            </a:endParaRPr>
+          </a:p>
+          <a:p>
+            <a:pPr indent="0" lvl="0" marL="914400" rtl="0" algn="l">
+              <a:lnSpc>
+                <a:spcPct val="115000"/>
+              </a:lnSpc>
+              <a:spcBef>
+                <a:spcPts val="0"/>
+              </a:spcBef>
+              <a:spcAft>
+                <a:spcPts val="0"/>
+              </a:spcAft>
+              <a:buClr>
+                <a:schemeClr val="dk1"/>
+              </a:buClr>
+              <a:buSzPts val="1100"/>
+              <a:buFont typeface="Arial"/>
+              <a:buNone/>
+            </a:pPr>
+            <a:r>
+              <a:rPr lang="en-US" sz="3000">
+                <a:solidFill>
+                  <a:schemeClr val="dk1"/>
+                </a:solidFill>
+                <a:latin typeface="Helvetica Neue"/>
+                <a:ea typeface="Helvetica Neue"/>
+                <a:cs typeface="Helvetica Neue"/>
+                <a:sym typeface="Helvetica Neue"/>
+              </a:rPr>
+              <a:t> </a:t>
+            </a:r>
+            <a:endParaRPr sz="3000"/>
+          </a:p>
+        </p:txBody>
+      </p:sp>
+      <p:pic>
+        <p:nvPicPr>
+          <p:cNvPr id="111" name="Google Shape;111;p1"/>
+          <p:cNvPicPr preferRelativeResize="0"/>
+          <p:nvPr/>
+        </p:nvPicPr>
+        <p:blipFill>
+          <a:blip r:embed="rId3">
+            <a:alphaModFix/>
+          </a:blip>
+          <a:stretch>
+            <a:fillRect/>
+          </a:stretch>
+        </p:blipFill>
+        <p:spPr>
+          <a:xfrm flipH="1">
+            <a:off x="766301" y="19417898"/>
+            <a:ext cx="624824" cy="624824"/>
+          </a:xfrm>
+          <a:prstGeom prst="rect">
+            <a:avLst/>
+          </a:prstGeom>
+          <a:noFill/>
+          <a:ln>
+            <a:noFill/>
+          </a:ln>
+        </p:spPr>
+      </p:pic>
+      <p:pic>
+        <p:nvPicPr>
+          <p:cNvPr id="112" name="Google Shape;112;p1"/>
+          <p:cNvPicPr preferRelativeResize="0"/>
+          <p:nvPr/>
+        </p:nvPicPr>
+        <p:blipFill>
+          <a:blip r:embed="rId3">
+            <a:alphaModFix/>
+          </a:blip>
+          <a:stretch>
+            <a:fillRect/>
+          </a:stretch>
+        </p:blipFill>
+        <p:spPr>
+          <a:xfrm flipH="1">
+            <a:off x="766305" y="26747675"/>
+            <a:ext cx="624824" cy="624824"/>
+          </a:xfrm>
+          <a:prstGeom prst="rect">
+            <a:avLst/>
+          </a:prstGeom>
+          <a:noFill/>
+          <a:ln>
+            <a:noFill/>
+          </a:ln>
+        </p:spPr>
+      </p:pic>
+      <p:pic>
+        <p:nvPicPr>
+          <p:cNvPr id="113" name="Google Shape;113;p1"/>
+          <p:cNvPicPr preferRelativeResize="0"/>
+          <p:nvPr/>
+        </p:nvPicPr>
+        <p:blipFill>
+          <a:blip r:embed="rId3">
+            <a:alphaModFix/>
+          </a:blip>
+          <a:stretch>
+            <a:fillRect/>
+          </a:stretch>
+        </p:blipFill>
+        <p:spPr>
+          <a:xfrm flipH="1">
+            <a:off x="1269576" y="20445048"/>
+            <a:ext cx="624824" cy="624824"/>
+          </a:xfrm>
+          <a:prstGeom prst="rect">
+            <a:avLst/>
+          </a:prstGeom>
+          <a:noFill/>
+          <a:ln>
+            <a:noFill/>
+          </a:ln>
+        </p:spPr>
+      </p:pic>
+      <p:pic>
+        <p:nvPicPr>
+          <p:cNvPr id="114" name="Google Shape;114;p1"/>
+          <p:cNvPicPr preferRelativeResize="0"/>
+          <p:nvPr/>
+        </p:nvPicPr>
+        <p:blipFill>
+          <a:blip r:embed="rId3">
+            <a:alphaModFix/>
+          </a:blip>
+          <a:stretch>
+            <a:fillRect/>
+          </a:stretch>
+        </p:blipFill>
+        <p:spPr>
+          <a:xfrm flipH="1">
+            <a:off x="766305" y="25190250"/>
+            <a:ext cx="624824" cy="624824"/>
+          </a:xfrm>
+          <a:prstGeom prst="rect">
+            <a:avLst/>
+          </a:prstGeom>
+          <a:noFill/>
+          <a:ln>
+            <a:noFill/>
+          </a:ln>
+        </p:spPr>
+      </p:pic>
+      <p:pic>
+        <p:nvPicPr>
+          <p:cNvPr id="115" name="Google Shape;115;p1"/>
+          <p:cNvPicPr preferRelativeResize="0"/>
+          <p:nvPr/>
+        </p:nvPicPr>
+        <p:blipFill>
+          <a:blip r:embed="rId3">
+            <a:alphaModFix/>
+          </a:blip>
+          <a:stretch>
+            <a:fillRect/>
+          </a:stretch>
+        </p:blipFill>
+        <p:spPr>
+          <a:xfrm flipH="1">
+            <a:off x="766301" y="20920098"/>
+            <a:ext cx="624824" cy="624824"/>
+          </a:xfrm>
+          <a:prstGeom prst="rect">
+            <a:avLst/>
+          </a:prstGeom>
+          <a:noFill/>
+          <a:ln>
+            <a:noFill/>
+          </a:ln>
+        </p:spPr>
+      </p:pic>
+      <p:pic>
+        <p:nvPicPr>
+          <p:cNvPr id="116" name="Google Shape;116;p1"/>
+          <p:cNvPicPr preferRelativeResize="0"/>
+          <p:nvPr/>
+        </p:nvPicPr>
+        <p:blipFill>
+          <a:blip r:embed="rId3">
+            <a:alphaModFix/>
+          </a:blip>
+          <a:stretch>
+            <a:fillRect/>
+          </a:stretch>
+        </p:blipFill>
+        <p:spPr>
+          <a:xfrm flipH="1">
+            <a:off x="766301" y="22004123"/>
+            <a:ext cx="624824" cy="624824"/>
+          </a:xfrm>
+          <a:prstGeom prst="rect">
+            <a:avLst/>
+          </a:prstGeom>
+          <a:noFill/>
+          <a:ln>
+            <a:noFill/>
+          </a:ln>
+        </p:spPr>
+      </p:pic>
+      <p:pic>
+        <p:nvPicPr>
+          <p:cNvPr id="117" name="Google Shape;117;p1"/>
+          <p:cNvPicPr preferRelativeResize="0"/>
+          <p:nvPr/>
+        </p:nvPicPr>
+        <p:blipFill>
+          <a:blip r:embed="rId3">
+            <a:alphaModFix/>
+          </a:blip>
+          <a:stretch>
+            <a:fillRect/>
+          </a:stretch>
+        </p:blipFill>
+        <p:spPr>
+          <a:xfrm flipH="1">
+            <a:off x="766305" y="23596363"/>
+            <a:ext cx="624824" cy="624824"/>
+          </a:xfrm>
+          <a:prstGeom prst="rect">
+            <a:avLst/>
+          </a:prstGeom>
+          <a:noFill/>
+          <a:ln>
+            <a:noFill/>
+          </a:ln>
+        </p:spPr>
+      </p:pic>
+      <p:pic>
+        <p:nvPicPr>
+          <p:cNvPr id="118" name="Google Shape;118;p1"/>
+          <p:cNvPicPr preferRelativeResize="0"/>
+          <p:nvPr/>
+        </p:nvPicPr>
+        <p:blipFill>
+          <a:blip r:embed="rId3">
+            <a:alphaModFix/>
+          </a:blip>
+          <a:stretch>
+            <a:fillRect/>
+          </a:stretch>
+        </p:blipFill>
+        <p:spPr>
+          <a:xfrm flipH="1">
+            <a:off x="1188726" y="24679573"/>
+            <a:ext cx="624824" cy="624824"/>
+          </a:xfrm>
+          <a:prstGeom prst="rect">
+            <a:avLst/>
+          </a:prstGeom>
+          <a:noFill/>
+          <a:ln>
+            <a:noFill/>
+          </a:ln>
+        </p:spPr>
+      </p:pic>
+      <p:pic>
+        <p:nvPicPr>
+          <p:cNvPr id="119" name="Google Shape;119;p1"/>
+          <p:cNvPicPr preferRelativeResize="0"/>
+          <p:nvPr/>
+        </p:nvPicPr>
+        <p:blipFill>
+          <a:blip r:embed="rId3">
+            <a:alphaModFix/>
+          </a:blip>
+          <a:stretch>
+            <a:fillRect/>
+          </a:stretch>
+        </p:blipFill>
+        <p:spPr>
+          <a:xfrm flipH="1">
+            <a:off x="1269580" y="27209000"/>
+            <a:ext cx="624824" cy="624824"/>
+          </a:xfrm>
+          <a:prstGeom prst="rect">
+            <a:avLst/>
+          </a:prstGeom>
+          <a:noFill/>
+          <a:ln>
+            <a:noFill/>
+          </a:ln>
+        </p:spPr>
+      </p:pic>
+      <p:pic>
+        <p:nvPicPr>
+          <p:cNvPr id="120" name="Google Shape;120;p1"/>
+          <p:cNvPicPr preferRelativeResize="0"/>
+          <p:nvPr/>
+        </p:nvPicPr>
+        <p:blipFill>
+          <a:blip r:embed="rId3">
+            <a:alphaModFix/>
+          </a:blip>
+          <a:stretch>
+            <a:fillRect/>
+          </a:stretch>
+        </p:blipFill>
+        <p:spPr>
+          <a:xfrm flipH="1">
+            <a:off x="33510980" y="28571350"/>
             <a:ext cx="624824" cy="624824"/>
           </a:xfrm>
           <a:prstGeom prst="rect">

</xml_diff>